<commit_message>
Updated the interface sketch
</commit_message>
<xml_diff>
--- a/Diseño/Spot it - Boceto de Interfaz.pptx
+++ b/Diseño/Spot it - Boceto de Interfaz.pptx
@@ -5,7 +5,7 @@
     <p:sldMasterId id="2147483648" r:id="rId1"/>
   </p:sldMasterIdLst>
   <p:notesMasterIdLst>
-    <p:notesMasterId r:id="rId11"/>
+    <p:notesMasterId r:id="rId12"/>
   </p:notesMasterIdLst>
   <p:sldIdLst>
     <p:sldId id="256" r:id="rId2"/>
@@ -17,6 +17,7 @@
     <p:sldId id="266" r:id="rId8"/>
     <p:sldId id="267" r:id="rId9"/>
     <p:sldId id="268" r:id="rId10"/>
+    <p:sldId id="269" r:id="rId11"/>
   </p:sldIdLst>
   <p:sldSz cx="9144000" cy="6858000" type="screen4x3"/>
   <p:notesSz cx="6858000" cy="9144000"/>
@@ -207,7 +208,7 @@
             <a:fld id="{8BC77FF1-B9E3-4976-878F-8B60164EA573}" type="datetimeFigureOut">
               <a:rPr lang="es-CL" smtClean="0"/>
               <a:pPr/>
-              <a:t>05-10-2012</a:t>
+              <a:t>13-10-2012</a:t>
             </a:fld>
             <a:endParaRPr lang="es-CL"/>
           </a:p>
@@ -1229,6 +1230,92 @@
 </p:notes>
 </file>
 
+<file path=ppt/notesSlides/notesSlide9.xml><?xml version="1.0" encoding="utf-8"?>
+<p:notes xmlns:a="http://schemas.openxmlformats.org/drawingml/2006/main" xmlns:r="http://schemas.openxmlformats.org/officeDocument/2006/relationships" xmlns:p="http://schemas.openxmlformats.org/presentationml/2006/main">
+  <p:cSld>
+    <p:spTree>
+      <p:nvGrpSpPr>
+        <p:cNvPr id="1" name=""/>
+        <p:cNvGrpSpPr/>
+        <p:nvPr/>
+      </p:nvGrpSpPr>
+      <p:grpSpPr>
+        <a:xfrm>
+          <a:off x="0" y="0"/>
+          <a:ext cx="0" cy="0"/>
+          <a:chOff x="0" y="0"/>
+          <a:chExt cx="0" cy="0"/>
+        </a:xfrm>
+      </p:grpSpPr>
+      <p:sp>
+        <p:nvSpPr>
+          <p:cNvPr id="2" name="Slide Image Placeholder 1"/>
+          <p:cNvSpPr>
+            <a:spLocks noGrp="1" noRot="1" noChangeAspect="1"/>
+          </p:cNvSpPr>
+          <p:nvPr>
+            <p:ph type="sldImg"/>
+          </p:nvPr>
+        </p:nvSpPr>
+        <p:spPr/>
+      </p:sp>
+      <p:sp>
+        <p:nvSpPr>
+          <p:cNvPr id="3" name="Notes Placeholder 2"/>
+          <p:cNvSpPr>
+            <a:spLocks noGrp="1"/>
+          </p:cNvSpPr>
+          <p:nvPr>
+            <p:ph type="body" idx="1"/>
+          </p:nvPr>
+        </p:nvSpPr>
+        <p:spPr/>
+        <p:txBody>
+          <a:bodyPr>
+            <a:normAutofit/>
+          </a:bodyPr>
+          <a:lstStyle/>
+          <a:p>
+            <a:r>
+              <a:rPr lang="es-CL" dirty="0" smtClean="0"/>
+              <a:t>Acá sale el mapa</a:t>
+            </a:r>
+            <a:endParaRPr lang="es-CL" dirty="0"/>
+          </a:p>
+        </p:txBody>
+      </p:sp>
+      <p:sp>
+        <p:nvSpPr>
+          <p:cNvPr id="4" name="Slide Number Placeholder 3"/>
+          <p:cNvSpPr>
+            <a:spLocks noGrp="1"/>
+          </p:cNvSpPr>
+          <p:nvPr>
+            <p:ph type="sldNum" sz="quarter" idx="10"/>
+          </p:nvPr>
+        </p:nvSpPr>
+        <p:spPr/>
+        <p:txBody>
+          <a:bodyPr/>
+          <a:lstStyle/>
+          <a:p>
+            <a:fld id="{D35FE5BB-43CA-4601-BB66-B0438049108F}" type="slidenum">
+              <a:rPr lang="es-CL" smtClean="0"/>
+              <a:pPr/>
+              <a:t>10</a:t>
+            </a:fld>
+            <a:endParaRPr lang="es-CL"/>
+          </a:p>
+        </p:txBody>
+      </p:sp>
+    </p:spTree>
+  </p:cSld>
+  <p:clrMapOvr>
+    <a:masterClrMapping/>
+  </p:clrMapOvr>
+</p:notes>
+</file>
+
 <file path=ppt/slideLayouts/slideLayout1.xml><?xml version="1.0" encoding="utf-8"?>
 <p:sldLayout xmlns:a="http://schemas.openxmlformats.org/drawingml/2006/main" xmlns:r="http://schemas.openxmlformats.org/officeDocument/2006/relationships" xmlns:p="http://schemas.openxmlformats.org/presentationml/2006/main" type="title" preserve="1">
   <p:cSld name="Title Slide">
@@ -1411,7 +1498,7 @@
             <a:fld id="{F43E7CD0-6A35-4941-AE38-9B0AC2DC948D}" type="datetimeFigureOut">
               <a:rPr lang="es-CL" smtClean="0"/>
               <a:pPr/>
-              <a:t>05-10-2012</a:t>
+              <a:t>13-10-2012</a:t>
             </a:fld>
             <a:endParaRPr lang="es-CL"/>
           </a:p>
@@ -1578,7 +1665,7 @@
             <a:fld id="{F43E7CD0-6A35-4941-AE38-9B0AC2DC948D}" type="datetimeFigureOut">
               <a:rPr lang="es-CL" smtClean="0"/>
               <a:pPr/>
-              <a:t>05-10-2012</a:t>
+              <a:t>13-10-2012</a:t>
             </a:fld>
             <a:endParaRPr lang="es-CL"/>
           </a:p>
@@ -1755,7 +1842,7 @@
             <a:fld id="{F43E7CD0-6A35-4941-AE38-9B0AC2DC948D}" type="datetimeFigureOut">
               <a:rPr lang="es-CL" smtClean="0"/>
               <a:pPr/>
-              <a:t>05-10-2012</a:t>
+              <a:t>13-10-2012</a:t>
             </a:fld>
             <a:endParaRPr lang="es-CL"/>
           </a:p>
@@ -1922,7 +2009,7 @@
             <a:fld id="{F43E7CD0-6A35-4941-AE38-9B0AC2DC948D}" type="datetimeFigureOut">
               <a:rPr lang="es-CL" smtClean="0"/>
               <a:pPr/>
-              <a:t>05-10-2012</a:t>
+              <a:t>13-10-2012</a:t>
             </a:fld>
             <a:endParaRPr lang="es-CL"/>
           </a:p>
@@ -2165,7 +2252,7 @@
             <a:fld id="{F43E7CD0-6A35-4941-AE38-9B0AC2DC948D}" type="datetimeFigureOut">
               <a:rPr lang="es-CL" smtClean="0"/>
               <a:pPr/>
-              <a:t>05-10-2012</a:t>
+              <a:t>13-10-2012</a:t>
             </a:fld>
             <a:endParaRPr lang="es-CL"/>
           </a:p>
@@ -2450,7 +2537,7 @@
             <a:fld id="{F43E7CD0-6A35-4941-AE38-9B0AC2DC948D}" type="datetimeFigureOut">
               <a:rPr lang="es-CL" smtClean="0"/>
               <a:pPr/>
-              <a:t>05-10-2012</a:t>
+              <a:t>13-10-2012</a:t>
             </a:fld>
             <a:endParaRPr lang="es-CL"/>
           </a:p>
@@ -2869,7 +2956,7 @@
             <a:fld id="{F43E7CD0-6A35-4941-AE38-9B0AC2DC948D}" type="datetimeFigureOut">
               <a:rPr lang="es-CL" smtClean="0"/>
               <a:pPr/>
-              <a:t>05-10-2012</a:t>
+              <a:t>13-10-2012</a:t>
             </a:fld>
             <a:endParaRPr lang="es-CL"/>
           </a:p>
@@ -2984,7 +3071,7 @@
             <a:fld id="{F43E7CD0-6A35-4941-AE38-9B0AC2DC948D}" type="datetimeFigureOut">
               <a:rPr lang="es-CL" smtClean="0"/>
               <a:pPr/>
-              <a:t>05-10-2012</a:t>
+              <a:t>13-10-2012</a:t>
             </a:fld>
             <a:endParaRPr lang="es-CL"/>
           </a:p>
@@ -3076,7 +3163,7 @@
             <a:fld id="{F43E7CD0-6A35-4941-AE38-9B0AC2DC948D}" type="datetimeFigureOut">
               <a:rPr lang="es-CL" smtClean="0"/>
               <a:pPr/>
-              <a:t>05-10-2012</a:t>
+              <a:t>13-10-2012</a:t>
             </a:fld>
             <a:endParaRPr lang="es-CL"/>
           </a:p>
@@ -3350,7 +3437,7 @@
             <a:fld id="{F43E7CD0-6A35-4941-AE38-9B0AC2DC948D}" type="datetimeFigureOut">
               <a:rPr lang="es-CL" smtClean="0"/>
               <a:pPr/>
-              <a:t>05-10-2012</a:t>
+              <a:t>13-10-2012</a:t>
             </a:fld>
             <a:endParaRPr lang="es-CL"/>
           </a:p>
@@ -3600,7 +3687,7 @@
             <a:fld id="{F43E7CD0-6A35-4941-AE38-9B0AC2DC948D}" type="datetimeFigureOut">
               <a:rPr lang="es-CL" smtClean="0"/>
               <a:pPr/>
-              <a:t>05-10-2012</a:t>
+              <a:t>13-10-2012</a:t>
             </a:fld>
             <a:endParaRPr lang="es-CL"/>
           </a:p>
@@ -3810,7 +3897,7 @@
             <a:fld id="{F43E7CD0-6A35-4941-AE38-9B0AC2DC948D}" type="datetimeFigureOut">
               <a:rPr lang="es-CL" smtClean="0"/>
               <a:pPr/>
-              <a:t>05-10-2012</a:t>
+              <a:t>13-10-2012</a:t>
             </a:fld>
             <a:endParaRPr lang="es-CL"/>
           </a:p>
@@ -4248,6 +4335,2372 @@
   <p:clrMapOvr>
     <a:masterClrMapping/>
   </p:clrMapOvr>
+  <p:timing>
+    <p:tnLst>
+      <p:par>
+        <p:cTn id="1" dur="indefinite" restart="never" nodeType="tmRoot"/>
+      </p:par>
+    </p:tnLst>
+  </p:timing>
+</p:sld>
+</file>
+
+<file path=ppt/slides/slide10.xml><?xml version="1.0" encoding="utf-8"?>
+<p:sld xmlns:a="http://schemas.openxmlformats.org/drawingml/2006/main" xmlns:r="http://schemas.openxmlformats.org/officeDocument/2006/relationships" xmlns:p="http://schemas.openxmlformats.org/presentationml/2006/main">
+  <p:cSld>
+    <p:spTree>
+      <p:nvGrpSpPr>
+        <p:cNvPr id="1" name=""/>
+        <p:cNvGrpSpPr/>
+        <p:nvPr/>
+      </p:nvGrpSpPr>
+      <p:grpSpPr>
+        <a:xfrm>
+          <a:off x="0" y="0"/>
+          <a:ext cx="0" cy="0"/>
+          <a:chOff x="0" y="0"/>
+          <a:chExt cx="0" cy="0"/>
+        </a:xfrm>
+      </p:grpSpPr>
+      <p:sp>
+        <p:nvSpPr>
+          <p:cNvPr id="5" name="Rectangle 4"/>
+          <p:cNvSpPr/>
+          <p:nvPr/>
+        </p:nvSpPr>
+        <p:spPr>
+          <a:xfrm>
+            <a:off x="611560" y="1412776"/>
+            <a:ext cx="7992888" cy="5040560"/>
+          </a:xfrm>
+          <a:prstGeom prst="rect">
+            <a:avLst/>
+          </a:prstGeom>
+          <a:solidFill>
+            <a:schemeClr val="bg1"/>
+          </a:solidFill>
+          <a:ln>
+            <a:solidFill>
+              <a:schemeClr val="accent4">
+                <a:lumMod val="50000"/>
+              </a:schemeClr>
+            </a:solidFill>
+          </a:ln>
+        </p:spPr>
+        <p:style>
+          <a:lnRef idx="2">
+            <a:schemeClr val="accent1">
+              <a:shade val="50000"/>
+            </a:schemeClr>
+          </a:lnRef>
+          <a:fillRef idx="1">
+            <a:schemeClr val="accent1"/>
+          </a:fillRef>
+          <a:effectRef idx="0">
+            <a:schemeClr val="accent1"/>
+          </a:effectRef>
+          <a:fontRef idx="minor">
+            <a:schemeClr val="lt1"/>
+          </a:fontRef>
+        </p:style>
+        <p:txBody>
+          <a:bodyPr rtlCol="0" anchor="ctr"/>
+          <a:lstStyle/>
+          <a:p>
+            <a:pPr algn="ctr"/>
+            <a:r>
+              <a:rPr lang="es-CL" sz="4400" dirty="0" smtClean="0">
+                <a:solidFill>
+                  <a:schemeClr val="tx1"/>
+                </a:solidFill>
+              </a:rPr>
+              <a:t>MAPA</a:t>
+            </a:r>
+            <a:endParaRPr lang="es-CL" sz="4400" dirty="0">
+              <a:solidFill>
+                <a:schemeClr val="tx1"/>
+              </a:solidFill>
+            </a:endParaRPr>
+          </a:p>
+        </p:txBody>
+      </p:sp>
+      <p:pic>
+        <p:nvPicPr>
+          <p:cNvPr id="20" name="Picture 19" descr="mapa2.jpg"/>
+          <p:cNvPicPr>
+            <a:picLocks noChangeAspect="1"/>
+          </p:cNvPicPr>
+          <p:nvPr/>
+        </p:nvPicPr>
+        <p:blipFill>
+          <a:blip r:embed="rId3" cstate="print"/>
+          <a:stretch>
+            <a:fillRect/>
+          </a:stretch>
+        </p:blipFill>
+        <p:spPr>
+          <a:xfrm>
+            <a:off x="1187624" y="1988840"/>
+            <a:ext cx="6768752" cy="4230312"/>
+          </a:xfrm>
+          <a:prstGeom prst="rect">
+            <a:avLst/>
+          </a:prstGeom>
+        </p:spPr>
+      </p:pic>
+      <p:sp>
+        <p:nvSpPr>
+          <p:cNvPr id="39" name="Rectangle 38"/>
+          <p:cNvSpPr/>
+          <p:nvPr/>
+        </p:nvSpPr>
+        <p:spPr>
+          <a:xfrm>
+            <a:off x="611560" y="692696"/>
+            <a:ext cx="7992888" cy="567680"/>
+          </a:xfrm>
+          <a:prstGeom prst="rect">
+            <a:avLst/>
+          </a:prstGeom>
+          <a:solidFill>
+            <a:schemeClr val="bg1"/>
+          </a:solidFill>
+          <a:ln>
+            <a:solidFill>
+              <a:schemeClr val="accent1"/>
+            </a:solidFill>
+          </a:ln>
+        </p:spPr>
+        <p:style>
+          <a:lnRef idx="2">
+            <a:schemeClr val="accent1">
+              <a:shade val="50000"/>
+            </a:schemeClr>
+          </a:lnRef>
+          <a:fillRef idx="1">
+            <a:schemeClr val="accent1"/>
+          </a:fillRef>
+          <a:effectRef idx="0">
+            <a:schemeClr val="accent1"/>
+          </a:effectRef>
+          <a:fontRef idx="minor">
+            <a:schemeClr val="lt1"/>
+          </a:fontRef>
+        </p:style>
+        <p:txBody>
+          <a:bodyPr rtlCol="0" anchor="ctr"/>
+          <a:lstStyle/>
+          <a:p>
+            <a:pPr algn="ctr"/>
+            <a:endParaRPr lang="es-CL" sz="4400" dirty="0">
+              <a:solidFill>
+                <a:schemeClr val="tx1"/>
+              </a:solidFill>
+            </a:endParaRPr>
+          </a:p>
+        </p:txBody>
+      </p:sp>
+      <p:sp>
+        <p:nvSpPr>
+          <p:cNvPr id="40" name="Rectangle 39"/>
+          <p:cNvSpPr/>
+          <p:nvPr/>
+        </p:nvSpPr>
+        <p:spPr>
+          <a:xfrm>
+            <a:off x="539552" y="692696"/>
+            <a:ext cx="1296144" cy="576064"/>
+          </a:xfrm>
+          <a:prstGeom prst="rect">
+            <a:avLst/>
+          </a:prstGeom>
+          <a:solidFill>
+            <a:schemeClr val="accent1">
+              <a:lumMod val="60000"/>
+              <a:lumOff val="40000"/>
+            </a:schemeClr>
+          </a:solidFill>
+          <a:ln>
+            <a:solidFill>
+              <a:schemeClr val="accent1"/>
+            </a:solidFill>
+          </a:ln>
+        </p:spPr>
+        <p:style>
+          <a:lnRef idx="2">
+            <a:schemeClr val="accent1">
+              <a:shade val="50000"/>
+            </a:schemeClr>
+          </a:lnRef>
+          <a:fillRef idx="1">
+            <a:schemeClr val="accent1"/>
+          </a:fillRef>
+          <a:effectRef idx="0">
+            <a:schemeClr val="accent1"/>
+          </a:effectRef>
+          <a:fontRef idx="minor">
+            <a:schemeClr val="lt1"/>
+          </a:fontRef>
+        </p:style>
+        <p:txBody>
+          <a:bodyPr rtlCol="0" anchor="ctr"/>
+          <a:lstStyle/>
+          <a:p>
+            <a:pPr algn="ctr"/>
+            <a:r>
+              <a:rPr lang="es-CL" sz="2400" dirty="0" smtClean="0">
+                <a:solidFill>
+                  <a:schemeClr val="bg1"/>
+                </a:solidFill>
+              </a:rPr>
+              <a:t>Spot </a:t>
+            </a:r>
+            <a:r>
+              <a:rPr lang="es-CL" sz="2400" dirty="0" err="1" smtClean="0">
+                <a:solidFill>
+                  <a:schemeClr val="bg1"/>
+                </a:solidFill>
+              </a:rPr>
+              <a:t>it!</a:t>
+            </a:r>
+            <a:endParaRPr lang="es-CL" sz="2400" dirty="0">
+              <a:solidFill>
+                <a:schemeClr val="bg1"/>
+              </a:solidFill>
+            </a:endParaRPr>
+          </a:p>
+        </p:txBody>
+      </p:sp>
+      <p:sp>
+        <p:nvSpPr>
+          <p:cNvPr id="41" name="Rectangle 40">
+            <a:hlinkClick r:id="rId4" action="ppaction://hlinksldjump"/>
+          </p:cNvPr>
+          <p:cNvSpPr/>
+          <p:nvPr/>
+        </p:nvSpPr>
+        <p:spPr>
+          <a:xfrm>
+            <a:off x="1780313" y="692696"/>
+            <a:ext cx="1279519" cy="576064"/>
+          </a:xfrm>
+          <a:prstGeom prst="rect">
+            <a:avLst/>
+          </a:prstGeom>
+          <a:solidFill>
+            <a:schemeClr val="accent1">
+              <a:lumMod val="60000"/>
+              <a:lumOff val="40000"/>
+            </a:schemeClr>
+          </a:solidFill>
+          <a:ln>
+            <a:solidFill>
+              <a:schemeClr val="accent1"/>
+            </a:solidFill>
+          </a:ln>
+        </p:spPr>
+        <p:style>
+          <a:lnRef idx="2">
+            <a:schemeClr val="accent1">
+              <a:shade val="50000"/>
+            </a:schemeClr>
+          </a:lnRef>
+          <a:fillRef idx="1">
+            <a:schemeClr val="accent1"/>
+          </a:fillRef>
+          <a:effectRef idx="0">
+            <a:schemeClr val="accent1"/>
+          </a:effectRef>
+          <a:fontRef idx="minor">
+            <a:schemeClr val="lt1"/>
+          </a:fontRef>
+        </p:style>
+        <p:txBody>
+          <a:bodyPr rtlCol="0" anchor="ctr"/>
+          <a:lstStyle/>
+          <a:p>
+            <a:pPr algn="ctr"/>
+            <a:r>
+              <a:rPr lang="es-CL" sz="2400" dirty="0" smtClean="0">
+                <a:solidFill>
+                  <a:schemeClr val="bg1"/>
+                </a:solidFill>
+              </a:rPr>
+              <a:t>Lugares</a:t>
+            </a:r>
+          </a:p>
+        </p:txBody>
+      </p:sp>
+      <p:sp>
+        <p:nvSpPr>
+          <p:cNvPr id="42" name="Rectangle 41"/>
+          <p:cNvSpPr/>
+          <p:nvPr/>
+        </p:nvSpPr>
+        <p:spPr>
+          <a:xfrm>
+            <a:off x="7308304" y="692696"/>
+            <a:ext cx="1296144" cy="576064"/>
+          </a:xfrm>
+          <a:prstGeom prst="rect">
+            <a:avLst/>
+          </a:prstGeom>
+          <a:solidFill>
+            <a:schemeClr val="accent1">
+              <a:lumMod val="60000"/>
+              <a:lumOff val="40000"/>
+            </a:schemeClr>
+          </a:solidFill>
+          <a:ln>
+            <a:solidFill>
+              <a:schemeClr val="accent1"/>
+            </a:solidFill>
+          </a:ln>
+        </p:spPr>
+        <p:style>
+          <a:lnRef idx="2">
+            <a:schemeClr val="accent1">
+              <a:shade val="50000"/>
+            </a:schemeClr>
+          </a:lnRef>
+          <a:fillRef idx="1">
+            <a:schemeClr val="accent1"/>
+          </a:fillRef>
+          <a:effectRef idx="0">
+            <a:schemeClr val="accent1"/>
+          </a:effectRef>
+          <a:fontRef idx="minor">
+            <a:schemeClr val="lt1"/>
+          </a:fontRef>
+        </p:style>
+        <p:txBody>
+          <a:bodyPr rtlCol="0" anchor="ctr"/>
+          <a:lstStyle/>
+          <a:p>
+            <a:pPr algn="ctr"/>
+            <a:r>
+              <a:rPr lang="es-CL" sz="2400" dirty="0" smtClean="0">
+                <a:solidFill>
+                  <a:schemeClr val="bg1"/>
+                </a:solidFill>
+              </a:rPr>
+              <a:t>Ariel</a:t>
+            </a:r>
+            <a:endParaRPr lang="es-CL" sz="2400" dirty="0">
+              <a:solidFill>
+                <a:schemeClr val="bg1"/>
+              </a:solidFill>
+            </a:endParaRPr>
+          </a:p>
+        </p:txBody>
+      </p:sp>
+      <p:sp>
+        <p:nvSpPr>
+          <p:cNvPr id="28" name="Rectangle 27">
+            <a:hlinkClick r:id="rId5" action="ppaction://hlinksldjump"/>
+          </p:cNvPr>
+          <p:cNvSpPr/>
+          <p:nvPr/>
+        </p:nvSpPr>
+        <p:spPr>
+          <a:xfrm>
+            <a:off x="4067944" y="692696"/>
+            <a:ext cx="1296144" cy="576064"/>
+          </a:xfrm>
+          <a:prstGeom prst="rect">
+            <a:avLst/>
+          </a:prstGeom>
+          <a:solidFill>
+            <a:schemeClr val="accent1">
+              <a:lumMod val="60000"/>
+              <a:lumOff val="40000"/>
+            </a:schemeClr>
+          </a:solidFill>
+          <a:ln>
+            <a:solidFill>
+              <a:schemeClr val="accent1"/>
+            </a:solidFill>
+          </a:ln>
+        </p:spPr>
+        <p:style>
+          <a:lnRef idx="2">
+            <a:schemeClr val="accent1">
+              <a:shade val="50000"/>
+            </a:schemeClr>
+          </a:lnRef>
+          <a:fillRef idx="1">
+            <a:schemeClr val="accent1"/>
+          </a:fillRef>
+          <a:effectRef idx="0">
+            <a:schemeClr val="accent1"/>
+          </a:effectRef>
+          <a:fontRef idx="minor">
+            <a:schemeClr val="lt1"/>
+          </a:fontRef>
+        </p:style>
+        <p:txBody>
+          <a:bodyPr rtlCol="0" anchor="ctr"/>
+          <a:lstStyle/>
+          <a:p>
+            <a:pPr algn="ctr"/>
+            <a:r>
+              <a:rPr lang="es-CL" sz="2400" dirty="0" smtClean="0">
+                <a:solidFill>
+                  <a:schemeClr val="bg1"/>
+                </a:solidFill>
+              </a:rPr>
+              <a:t>Personas</a:t>
+            </a:r>
+            <a:endParaRPr lang="es-CL" sz="2400" dirty="0">
+              <a:solidFill>
+                <a:schemeClr val="bg1"/>
+              </a:solidFill>
+            </a:endParaRPr>
+          </a:p>
+        </p:txBody>
+      </p:sp>
+      <p:sp>
+        <p:nvSpPr>
+          <p:cNvPr id="88" name="Rectangle 87">
+            <a:hlinkClick r:id="rId5" action="ppaction://hlinksldjump"/>
+          </p:cNvPr>
+          <p:cNvSpPr/>
+          <p:nvPr/>
+        </p:nvSpPr>
+        <p:spPr>
+          <a:xfrm>
+            <a:off x="3059832" y="692696"/>
+            <a:ext cx="999728" cy="576064"/>
+          </a:xfrm>
+          <a:prstGeom prst="rect">
+            <a:avLst/>
+          </a:prstGeom>
+          <a:solidFill>
+            <a:schemeClr val="accent1">
+              <a:lumMod val="60000"/>
+              <a:lumOff val="40000"/>
+            </a:schemeClr>
+          </a:solidFill>
+          <a:ln>
+            <a:solidFill>
+              <a:schemeClr val="accent1"/>
+            </a:solidFill>
+          </a:ln>
+        </p:spPr>
+        <p:style>
+          <a:lnRef idx="2">
+            <a:schemeClr val="accent1">
+              <a:shade val="50000"/>
+            </a:schemeClr>
+          </a:lnRef>
+          <a:fillRef idx="1">
+            <a:schemeClr val="accent1"/>
+          </a:fillRef>
+          <a:effectRef idx="0">
+            <a:schemeClr val="accent1"/>
+          </a:effectRef>
+          <a:fontRef idx="minor">
+            <a:schemeClr val="lt1"/>
+          </a:fontRef>
+        </p:style>
+        <p:txBody>
+          <a:bodyPr rtlCol="0" anchor="ctr"/>
+          <a:lstStyle/>
+          <a:p>
+            <a:pPr algn="ctr"/>
+            <a:r>
+              <a:rPr lang="es-CL" sz="2400" dirty="0" smtClean="0">
+                <a:solidFill>
+                  <a:schemeClr val="bg1"/>
+                </a:solidFill>
+              </a:rPr>
+              <a:t>Salas</a:t>
+            </a:r>
+            <a:endParaRPr lang="es-CL" sz="2400" dirty="0">
+              <a:solidFill>
+                <a:schemeClr val="bg1"/>
+              </a:solidFill>
+            </a:endParaRPr>
+          </a:p>
+        </p:txBody>
+      </p:sp>
+      <p:sp>
+        <p:nvSpPr>
+          <p:cNvPr id="43" name="Rectangle 42">
+            <a:hlinkClick r:id="rId4" action="ppaction://hlinksldjump"/>
+          </p:cNvPr>
+          <p:cNvSpPr/>
+          <p:nvPr/>
+        </p:nvSpPr>
+        <p:spPr>
+          <a:xfrm>
+            <a:off x="5364088" y="692696"/>
+            <a:ext cx="1944216" cy="576064"/>
+          </a:xfrm>
+          <a:prstGeom prst="rect">
+            <a:avLst/>
+          </a:prstGeom>
+          <a:solidFill>
+            <a:schemeClr val="tx2">
+              <a:lumMod val="60000"/>
+              <a:lumOff val="40000"/>
+            </a:schemeClr>
+          </a:solidFill>
+          <a:ln>
+            <a:solidFill>
+              <a:schemeClr val="tx2"/>
+            </a:solidFill>
+          </a:ln>
+        </p:spPr>
+        <p:style>
+          <a:lnRef idx="2">
+            <a:schemeClr val="accent1">
+              <a:shade val="50000"/>
+            </a:schemeClr>
+          </a:lnRef>
+          <a:fillRef idx="1">
+            <a:schemeClr val="accent1"/>
+          </a:fillRef>
+          <a:effectRef idx="0">
+            <a:schemeClr val="accent1"/>
+          </a:effectRef>
+          <a:fontRef idx="minor">
+            <a:schemeClr val="lt1"/>
+          </a:fontRef>
+        </p:style>
+        <p:txBody>
+          <a:bodyPr rtlCol="0" anchor="ctr"/>
+          <a:lstStyle/>
+          <a:p>
+            <a:pPr algn="ctr"/>
+            <a:r>
+              <a:rPr lang="es-CL" sz="2400" dirty="0" smtClean="0">
+                <a:solidFill>
+                  <a:schemeClr val="bg1"/>
+                </a:solidFill>
+              </a:rPr>
+              <a:t>Eventos</a:t>
+            </a:r>
+            <a:endParaRPr lang="es-CL" sz="2400" dirty="0">
+              <a:solidFill>
+                <a:schemeClr val="bg1"/>
+              </a:solidFill>
+            </a:endParaRPr>
+          </a:p>
+        </p:txBody>
+      </p:sp>
+      <p:grpSp>
+        <p:nvGrpSpPr>
+          <p:cNvPr id="119" name="Group 118"/>
+          <p:cNvGrpSpPr/>
+          <p:nvPr/>
+        </p:nvGrpSpPr>
+        <p:grpSpPr>
+          <a:xfrm>
+            <a:off x="611560" y="6237312"/>
+            <a:ext cx="7992888" cy="216024"/>
+            <a:chOff x="611560" y="6237312"/>
+            <a:chExt cx="7992888" cy="216024"/>
+          </a:xfrm>
+        </p:grpSpPr>
+        <p:sp>
+          <p:nvSpPr>
+            <p:cNvPr id="24" name="Rectangle 23"/>
+            <p:cNvSpPr/>
+            <p:nvPr/>
+          </p:nvSpPr>
+          <p:spPr>
+            <a:xfrm>
+              <a:off x="611560" y="6237312"/>
+              <a:ext cx="7992888" cy="216024"/>
+            </a:xfrm>
+            <a:prstGeom prst="rect">
+              <a:avLst/>
+            </a:prstGeom>
+            <a:solidFill>
+              <a:schemeClr val="bg1">
+                <a:lumMod val="95000"/>
+              </a:schemeClr>
+            </a:solidFill>
+            <a:ln>
+              <a:solidFill>
+                <a:schemeClr val="tx1">
+                  <a:lumMod val="75000"/>
+                  <a:lumOff val="25000"/>
+                </a:schemeClr>
+              </a:solidFill>
+            </a:ln>
+          </p:spPr>
+          <p:style>
+            <a:lnRef idx="2">
+              <a:schemeClr val="accent1">
+                <a:shade val="50000"/>
+              </a:schemeClr>
+            </a:lnRef>
+            <a:fillRef idx="1">
+              <a:schemeClr val="accent1"/>
+            </a:fillRef>
+            <a:effectRef idx="0">
+              <a:schemeClr val="accent1"/>
+            </a:effectRef>
+            <a:fontRef idx="minor">
+              <a:schemeClr val="lt1"/>
+            </a:fontRef>
+          </p:style>
+          <p:txBody>
+            <a:bodyPr rtlCol="0" anchor="ctr"/>
+            <a:lstStyle/>
+            <a:p>
+              <a:pPr algn="ctr"/>
+              <a:endParaRPr lang="es-CL"/>
+            </a:p>
+          </p:txBody>
+        </p:sp>
+        <p:grpSp>
+          <p:nvGrpSpPr>
+            <p:cNvPr id="3" name="Group 27"/>
+            <p:cNvGrpSpPr/>
+            <p:nvPr/>
+          </p:nvGrpSpPr>
+          <p:grpSpPr>
+            <a:xfrm>
+              <a:off x="8388424" y="6237312"/>
+              <a:ext cx="216024" cy="216024"/>
+              <a:chOff x="8388424" y="6237312"/>
+              <a:chExt cx="216024" cy="216024"/>
+            </a:xfrm>
+          </p:grpSpPr>
+          <p:sp>
+            <p:nvSpPr>
+              <p:cNvPr id="25" name="Rectangle 24"/>
+              <p:cNvSpPr/>
+              <p:nvPr/>
+            </p:nvSpPr>
+            <p:spPr>
+              <a:xfrm>
+                <a:off x="8388424" y="6237312"/>
+                <a:ext cx="216024" cy="216024"/>
+              </a:xfrm>
+              <a:prstGeom prst="rect">
+                <a:avLst/>
+              </a:prstGeom>
+              <a:solidFill>
+                <a:schemeClr val="bg1">
+                  <a:lumMod val="95000"/>
+                </a:schemeClr>
+              </a:solidFill>
+              <a:ln>
+                <a:solidFill>
+                  <a:schemeClr val="tx1">
+                    <a:lumMod val="75000"/>
+                    <a:lumOff val="25000"/>
+                  </a:schemeClr>
+                </a:solidFill>
+              </a:ln>
+            </p:spPr>
+            <p:style>
+              <a:lnRef idx="2">
+                <a:schemeClr val="accent1">
+                  <a:shade val="50000"/>
+                </a:schemeClr>
+              </a:lnRef>
+              <a:fillRef idx="1">
+                <a:schemeClr val="accent1"/>
+              </a:fillRef>
+              <a:effectRef idx="0">
+                <a:schemeClr val="accent1"/>
+              </a:effectRef>
+              <a:fontRef idx="minor">
+                <a:schemeClr val="lt1"/>
+              </a:fontRef>
+            </p:style>
+            <p:txBody>
+              <a:bodyPr rtlCol="0" anchor="ctr"/>
+              <a:lstStyle/>
+              <a:p>
+                <a:pPr algn="ctr"/>
+                <a:endParaRPr lang="es-CL"/>
+              </a:p>
+            </p:txBody>
+          </p:sp>
+          <p:sp>
+            <p:nvSpPr>
+              <p:cNvPr id="27" name="Isosceles Triangle 26"/>
+              <p:cNvSpPr/>
+              <p:nvPr/>
+            </p:nvSpPr>
+            <p:spPr>
+              <a:xfrm rot="5400000">
+                <a:off x="8388424" y="6237312"/>
+                <a:ext cx="216024" cy="216024"/>
+              </a:xfrm>
+              <a:prstGeom prst="triangle">
+                <a:avLst/>
+              </a:prstGeom>
+              <a:solidFill>
+                <a:schemeClr val="bg1">
+                  <a:lumMod val="75000"/>
+                </a:schemeClr>
+              </a:solidFill>
+              <a:ln>
+                <a:solidFill>
+                  <a:schemeClr val="tx1">
+                    <a:lumMod val="75000"/>
+                    <a:lumOff val="25000"/>
+                  </a:schemeClr>
+                </a:solidFill>
+              </a:ln>
+            </p:spPr>
+            <p:style>
+              <a:lnRef idx="2">
+                <a:schemeClr val="accent1">
+                  <a:shade val="50000"/>
+                </a:schemeClr>
+              </a:lnRef>
+              <a:fillRef idx="1">
+                <a:schemeClr val="accent1"/>
+              </a:fillRef>
+              <a:effectRef idx="0">
+                <a:schemeClr val="accent1"/>
+              </a:effectRef>
+              <a:fontRef idx="minor">
+                <a:schemeClr val="lt1"/>
+              </a:fontRef>
+            </p:style>
+            <p:txBody>
+              <a:bodyPr rtlCol="0" anchor="ctr"/>
+              <a:lstStyle/>
+              <a:p>
+                <a:pPr algn="ctr"/>
+                <a:endParaRPr lang="es-CL"/>
+              </a:p>
+            </p:txBody>
+          </p:sp>
+        </p:grpSp>
+        <p:sp>
+          <p:nvSpPr>
+            <p:cNvPr id="32" name="Rectangle 31"/>
+            <p:cNvSpPr/>
+            <p:nvPr/>
+          </p:nvSpPr>
+          <p:spPr>
+            <a:xfrm>
+              <a:off x="2483768" y="6237312"/>
+              <a:ext cx="4464496" cy="216024"/>
+            </a:xfrm>
+            <a:prstGeom prst="rect">
+              <a:avLst/>
+            </a:prstGeom>
+            <a:solidFill>
+              <a:schemeClr val="bg1">
+                <a:lumMod val="75000"/>
+              </a:schemeClr>
+            </a:solidFill>
+            <a:ln>
+              <a:solidFill>
+                <a:schemeClr val="tx1">
+                  <a:lumMod val="75000"/>
+                  <a:lumOff val="25000"/>
+                </a:schemeClr>
+              </a:solidFill>
+            </a:ln>
+          </p:spPr>
+          <p:style>
+            <a:lnRef idx="2">
+              <a:schemeClr val="accent1">
+                <a:shade val="50000"/>
+              </a:schemeClr>
+            </a:lnRef>
+            <a:fillRef idx="1">
+              <a:schemeClr val="accent1"/>
+            </a:fillRef>
+            <a:effectRef idx="0">
+              <a:schemeClr val="accent1"/>
+            </a:effectRef>
+            <a:fontRef idx="minor">
+              <a:schemeClr val="lt1"/>
+            </a:fontRef>
+          </p:style>
+          <p:txBody>
+            <a:bodyPr rtlCol="0" anchor="ctr"/>
+            <a:lstStyle/>
+            <a:p>
+              <a:pPr algn="ctr"/>
+              <a:endParaRPr lang="es-CL"/>
+            </a:p>
+          </p:txBody>
+        </p:sp>
+        <p:grpSp>
+          <p:nvGrpSpPr>
+            <p:cNvPr id="4" name="Group 28"/>
+            <p:cNvGrpSpPr/>
+            <p:nvPr/>
+          </p:nvGrpSpPr>
+          <p:grpSpPr>
+            <a:xfrm rot="10800000">
+              <a:off x="611560" y="6237312"/>
+              <a:ext cx="216024" cy="216024"/>
+              <a:chOff x="8388424" y="6237312"/>
+              <a:chExt cx="216024" cy="216024"/>
+            </a:xfrm>
+          </p:grpSpPr>
+          <p:sp>
+            <p:nvSpPr>
+              <p:cNvPr id="30" name="Rectangle 29"/>
+              <p:cNvSpPr/>
+              <p:nvPr/>
+            </p:nvSpPr>
+            <p:spPr>
+              <a:xfrm>
+                <a:off x="8388424" y="6237312"/>
+                <a:ext cx="216024" cy="216024"/>
+              </a:xfrm>
+              <a:prstGeom prst="rect">
+                <a:avLst/>
+              </a:prstGeom>
+              <a:solidFill>
+                <a:schemeClr val="bg1">
+                  <a:lumMod val="95000"/>
+                </a:schemeClr>
+              </a:solidFill>
+              <a:ln>
+                <a:solidFill>
+                  <a:schemeClr val="tx1">
+                    <a:lumMod val="75000"/>
+                    <a:lumOff val="25000"/>
+                  </a:schemeClr>
+                </a:solidFill>
+              </a:ln>
+            </p:spPr>
+            <p:style>
+              <a:lnRef idx="2">
+                <a:schemeClr val="accent1">
+                  <a:shade val="50000"/>
+                </a:schemeClr>
+              </a:lnRef>
+              <a:fillRef idx="1">
+                <a:schemeClr val="accent1"/>
+              </a:fillRef>
+              <a:effectRef idx="0">
+                <a:schemeClr val="accent1"/>
+              </a:effectRef>
+              <a:fontRef idx="minor">
+                <a:schemeClr val="lt1"/>
+              </a:fontRef>
+            </p:style>
+            <p:txBody>
+              <a:bodyPr rtlCol="0" anchor="ctr"/>
+              <a:lstStyle/>
+              <a:p>
+                <a:pPr algn="ctr"/>
+                <a:endParaRPr lang="es-CL"/>
+              </a:p>
+            </p:txBody>
+          </p:sp>
+          <p:sp>
+            <p:nvSpPr>
+              <p:cNvPr id="31" name="Isosceles Triangle 30"/>
+              <p:cNvSpPr/>
+              <p:nvPr/>
+            </p:nvSpPr>
+            <p:spPr>
+              <a:xfrm rot="5400000">
+                <a:off x="8388424" y="6237312"/>
+                <a:ext cx="216024" cy="216024"/>
+              </a:xfrm>
+              <a:prstGeom prst="triangle">
+                <a:avLst/>
+              </a:prstGeom>
+              <a:solidFill>
+                <a:schemeClr val="bg1">
+                  <a:lumMod val="75000"/>
+                </a:schemeClr>
+              </a:solidFill>
+              <a:ln>
+                <a:solidFill>
+                  <a:schemeClr val="tx1">
+                    <a:lumMod val="75000"/>
+                    <a:lumOff val="25000"/>
+                  </a:schemeClr>
+                </a:solidFill>
+              </a:ln>
+            </p:spPr>
+            <p:style>
+              <a:lnRef idx="2">
+                <a:schemeClr val="accent1">
+                  <a:shade val="50000"/>
+                </a:schemeClr>
+              </a:lnRef>
+              <a:fillRef idx="1">
+                <a:schemeClr val="accent1"/>
+              </a:fillRef>
+              <a:effectRef idx="0">
+                <a:schemeClr val="accent1"/>
+              </a:effectRef>
+              <a:fontRef idx="minor">
+                <a:schemeClr val="lt1"/>
+              </a:fontRef>
+            </p:style>
+            <p:txBody>
+              <a:bodyPr rtlCol="0" anchor="ctr"/>
+              <a:lstStyle/>
+              <a:p>
+                <a:pPr algn="ctr"/>
+                <a:endParaRPr lang="es-CL"/>
+              </a:p>
+            </p:txBody>
+          </p:sp>
+        </p:grpSp>
+      </p:grpSp>
+      <p:grpSp>
+        <p:nvGrpSpPr>
+          <p:cNvPr id="121" name="Group 120"/>
+          <p:cNvGrpSpPr/>
+          <p:nvPr/>
+        </p:nvGrpSpPr>
+        <p:grpSpPr>
+          <a:xfrm>
+            <a:off x="2375187" y="2204864"/>
+            <a:ext cx="5797213" cy="3528392"/>
+            <a:chOff x="2015147" y="2636912"/>
+            <a:chExt cx="5797213" cy="3528392"/>
+          </a:xfrm>
+        </p:grpSpPr>
+        <p:grpSp>
+          <p:nvGrpSpPr>
+            <p:cNvPr id="7" name="Group 89"/>
+            <p:cNvGrpSpPr/>
+            <p:nvPr/>
+          </p:nvGrpSpPr>
+          <p:grpSpPr>
+            <a:xfrm>
+              <a:off x="2195736" y="2636912"/>
+              <a:ext cx="5616624" cy="3528392"/>
+              <a:chOff x="2771800" y="2780928"/>
+              <a:chExt cx="3744416" cy="2627526"/>
+            </a:xfrm>
+            <a:noFill/>
+          </p:grpSpPr>
+          <p:sp>
+            <p:nvSpPr>
+              <p:cNvPr id="33" name="Rectangle 32"/>
+              <p:cNvSpPr/>
+              <p:nvPr/>
+            </p:nvSpPr>
+            <p:spPr>
+              <a:xfrm>
+                <a:off x="2771800" y="2780928"/>
+                <a:ext cx="3744416" cy="2627526"/>
+              </a:xfrm>
+              <a:prstGeom prst="rect">
+                <a:avLst/>
+              </a:prstGeom>
+              <a:solidFill>
+                <a:srgbClr val="DCE6F2">
+                  <a:alpha val="80000"/>
+                </a:srgbClr>
+              </a:solidFill>
+              <a:ln>
+                <a:solidFill>
+                  <a:schemeClr val="accent1"/>
+                </a:solidFill>
+              </a:ln>
+            </p:spPr>
+            <p:style>
+              <a:lnRef idx="2">
+                <a:schemeClr val="accent1">
+                  <a:shade val="50000"/>
+                </a:schemeClr>
+              </a:lnRef>
+              <a:fillRef idx="1">
+                <a:schemeClr val="accent1"/>
+              </a:fillRef>
+              <a:effectRef idx="0">
+                <a:schemeClr val="accent1"/>
+              </a:effectRef>
+              <a:fontRef idx="minor">
+                <a:schemeClr val="lt1"/>
+              </a:fontRef>
+            </p:style>
+            <p:txBody>
+              <a:bodyPr rtlCol="0" anchor="ctr"/>
+              <a:lstStyle/>
+              <a:p>
+                <a:pPr algn="ctr"/>
+                <a:endParaRPr lang="es-CL"/>
+              </a:p>
+            </p:txBody>
+          </p:sp>
+          <p:sp>
+            <p:nvSpPr>
+              <p:cNvPr id="80" name="TextBox 79"/>
+              <p:cNvSpPr txBox="1"/>
+              <p:nvPr/>
+            </p:nvSpPr>
+            <p:spPr>
+              <a:xfrm>
+                <a:off x="2843808" y="2852936"/>
+                <a:ext cx="3672408" cy="425218"/>
+              </a:xfrm>
+              <a:prstGeom prst="rect">
+                <a:avLst/>
+              </a:prstGeom>
+              <a:grpFill/>
+            </p:spPr>
+            <p:txBody>
+              <a:bodyPr wrap="square" rtlCol="0">
+                <a:spAutoFit/>
+              </a:bodyPr>
+              <a:lstStyle/>
+              <a:p>
+                <a:r>
+                  <a:rPr lang="es-CL" sz="2400" i="1" dirty="0" smtClean="0"/>
+                  <a:t> </a:t>
+                </a:r>
+                <a:r>
+                  <a:rPr lang="es-CL" sz="2400" i="1" dirty="0" smtClean="0">
+                    <a:solidFill>
+                      <a:schemeClr val="tx1">
+                        <a:lumMod val="75000"/>
+                        <a:lumOff val="25000"/>
+                      </a:schemeClr>
+                    </a:solidFill>
+                  </a:rPr>
+                  <a:t>Edificio San Agustín:</a:t>
+                </a:r>
+                <a:endParaRPr lang="es-CL" sz="2400" i="1" dirty="0">
+                  <a:solidFill>
+                    <a:schemeClr val="tx1">
+                      <a:lumMod val="75000"/>
+                      <a:lumOff val="25000"/>
+                    </a:schemeClr>
+                  </a:solidFill>
+                </a:endParaRPr>
+              </a:p>
+            </p:txBody>
+          </p:sp>
+        </p:grpSp>
+        <p:grpSp>
+          <p:nvGrpSpPr>
+            <p:cNvPr id="120" name="Group 119"/>
+            <p:cNvGrpSpPr/>
+            <p:nvPr/>
+          </p:nvGrpSpPr>
+          <p:grpSpPr>
+            <a:xfrm>
+              <a:off x="2015147" y="3429000"/>
+              <a:ext cx="1354216" cy="2496638"/>
+              <a:chOff x="2015147" y="3429000"/>
+              <a:chExt cx="1354216" cy="2496638"/>
+            </a:xfrm>
+          </p:grpSpPr>
+          <p:sp>
+            <p:nvSpPr>
+              <p:cNvPr id="62" name="Diagonal Stripe 61"/>
+              <p:cNvSpPr/>
+              <p:nvPr/>
+            </p:nvSpPr>
+            <p:spPr>
+              <a:xfrm rot="9045543">
+                <a:off x="2015147" y="3429000"/>
+                <a:ext cx="1354216" cy="2496638"/>
+              </a:xfrm>
+              <a:prstGeom prst="diagStripe">
+                <a:avLst>
+                  <a:gd name="adj" fmla="val 43288"/>
+                </a:avLst>
+              </a:prstGeom>
+              <a:solidFill>
+                <a:schemeClr val="accent1">
+                  <a:alpha val="50000"/>
+                </a:schemeClr>
+              </a:solidFill>
+            </p:spPr>
+            <p:style>
+              <a:lnRef idx="2">
+                <a:schemeClr val="accent1">
+                  <a:shade val="50000"/>
+                </a:schemeClr>
+              </a:lnRef>
+              <a:fillRef idx="1">
+                <a:schemeClr val="accent1"/>
+              </a:fillRef>
+              <a:effectRef idx="0">
+                <a:schemeClr val="accent1"/>
+              </a:effectRef>
+              <a:fontRef idx="minor">
+                <a:schemeClr val="lt1"/>
+              </a:fontRef>
+            </p:style>
+            <p:txBody>
+              <a:bodyPr rtlCol="0" anchor="ctr"/>
+              <a:lstStyle/>
+              <a:p>
+                <a:pPr algn="ctr"/>
+                <a:endParaRPr lang="es-CL">
+                  <a:solidFill>
+                    <a:schemeClr val="tx1"/>
+                  </a:solidFill>
+                </a:endParaRPr>
+              </a:p>
+            </p:txBody>
+          </p:sp>
+          <p:cxnSp>
+            <p:nvCxnSpPr>
+              <p:cNvPr id="66" name="Straight Connector 65"/>
+              <p:cNvCxnSpPr/>
+              <p:nvPr/>
+            </p:nvCxnSpPr>
+            <p:spPr>
+              <a:xfrm>
+                <a:off x="2699792" y="4050134"/>
+                <a:ext cx="432048" cy="0"/>
+              </a:xfrm>
+              <a:prstGeom prst="line">
+                <a:avLst/>
+              </a:prstGeom>
+              <a:ln w="28575">
+                <a:prstDash val="sysDash"/>
+              </a:ln>
+            </p:spPr>
+            <p:style>
+              <a:lnRef idx="1">
+                <a:schemeClr val="accent1"/>
+              </a:lnRef>
+              <a:fillRef idx="0">
+                <a:schemeClr val="accent1"/>
+              </a:fillRef>
+              <a:effectRef idx="0">
+                <a:schemeClr val="accent1"/>
+              </a:effectRef>
+              <a:fontRef idx="minor">
+                <a:schemeClr val="tx1"/>
+              </a:fontRef>
+            </p:style>
+          </p:cxnSp>
+          <p:cxnSp>
+            <p:nvCxnSpPr>
+              <p:cNvPr id="67" name="Straight Connector 66"/>
+              <p:cNvCxnSpPr/>
+              <p:nvPr/>
+            </p:nvCxnSpPr>
+            <p:spPr>
+              <a:xfrm>
+                <a:off x="2699792" y="4482182"/>
+                <a:ext cx="432048" cy="0"/>
+              </a:xfrm>
+              <a:prstGeom prst="line">
+                <a:avLst/>
+              </a:prstGeom>
+              <a:ln w="28575">
+                <a:prstDash val="sysDash"/>
+              </a:ln>
+            </p:spPr>
+            <p:style>
+              <a:lnRef idx="1">
+                <a:schemeClr val="accent1"/>
+              </a:lnRef>
+              <a:fillRef idx="0">
+                <a:schemeClr val="accent1"/>
+              </a:fillRef>
+              <a:effectRef idx="0">
+                <a:schemeClr val="accent1"/>
+              </a:effectRef>
+              <a:fontRef idx="minor">
+                <a:schemeClr val="tx1"/>
+              </a:fontRef>
+            </p:style>
+          </p:cxnSp>
+          <p:cxnSp>
+            <p:nvCxnSpPr>
+              <p:cNvPr id="69" name="Straight Connector 68"/>
+              <p:cNvCxnSpPr/>
+              <p:nvPr/>
+            </p:nvCxnSpPr>
+            <p:spPr>
+              <a:xfrm>
+                <a:off x="2699792" y="4986238"/>
+                <a:ext cx="432048" cy="0"/>
+              </a:xfrm>
+              <a:prstGeom prst="line">
+                <a:avLst/>
+              </a:prstGeom>
+              <a:ln w="28575">
+                <a:prstDash val="sysDash"/>
+              </a:ln>
+            </p:spPr>
+            <p:style>
+              <a:lnRef idx="1">
+                <a:schemeClr val="accent1"/>
+              </a:lnRef>
+              <a:fillRef idx="0">
+                <a:schemeClr val="accent1"/>
+              </a:fillRef>
+              <a:effectRef idx="0">
+                <a:schemeClr val="accent1"/>
+              </a:effectRef>
+              <a:fontRef idx="minor">
+                <a:schemeClr val="tx1"/>
+              </a:fontRef>
+            </p:style>
+          </p:cxnSp>
+          <p:cxnSp>
+            <p:nvCxnSpPr>
+              <p:cNvPr id="70" name="Straight Connector 69"/>
+              <p:cNvCxnSpPr/>
+              <p:nvPr/>
+            </p:nvCxnSpPr>
+            <p:spPr>
+              <a:xfrm>
+                <a:off x="3131840" y="4482182"/>
+                <a:ext cx="0" cy="288032"/>
+              </a:xfrm>
+              <a:prstGeom prst="line">
+                <a:avLst/>
+              </a:prstGeom>
+              <a:ln w="28575">
+                <a:prstDash val="sysDash"/>
+              </a:ln>
+            </p:spPr>
+            <p:style>
+              <a:lnRef idx="1">
+                <a:schemeClr val="accent1"/>
+              </a:lnRef>
+              <a:fillRef idx="0">
+                <a:schemeClr val="accent1"/>
+              </a:fillRef>
+              <a:effectRef idx="0">
+                <a:schemeClr val="accent1"/>
+              </a:effectRef>
+              <a:fontRef idx="minor">
+                <a:schemeClr val="tx1"/>
+              </a:fontRef>
+            </p:style>
+          </p:cxnSp>
+          <p:cxnSp>
+            <p:nvCxnSpPr>
+              <p:cNvPr id="75" name="Straight Connector 74"/>
+              <p:cNvCxnSpPr/>
+              <p:nvPr/>
+            </p:nvCxnSpPr>
+            <p:spPr>
+              <a:xfrm>
+                <a:off x="2699792" y="5490294"/>
+                <a:ext cx="432048" cy="0"/>
+              </a:xfrm>
+              <a:prstGeom prst="line">
+                <a:avLst/>
+              </a:prstGeom>
+              <a:ln w="28575">
+                <a:prstDash val="sysDash"/>
+              </a:ln>
+            </p:spPr>
+            <p:style>
+              <a:lnRef idx="1">
+                <a:schemeClr val="accent1"/>
+              </a:lnRef>
+              <a:fillRef idx="0">
+                <a:schemeClr val="accent1"/>
+              </a:fillRef>
+              <a:effectRef idx="0">
+                <a:schemeClr val="accent1"/>
+              </a:effectRef>
+              <a:fontRef idx="minor">
+                <a:schemeClr val="tx1"/>
+              </a:fontRef>
+            </p:style>
+          </p:cxnSp>
+          <p:cxnSp>
+            <p:nvCxnSpPr>
+              <p:cNvPr id="76" name="Straight Connector 75"/>
+              <p:cNvCxnSpPr/>
+              <p:nvPr/>
+            </p:nvCxnSpPr>
+            <p:spPr>
+              <a:xfrm>
+                <a:off x="3131840" y="4986238"/>
+                <a:ext cx="0" cy="216024"/>
+              </a:xfrm>
+              <a:prstGeom prst="line">
+                <a:avLst/>
+              </a:prstGeom>
+              <a:ln w="28575">
+                <a:prstDash val="sysDash"/>
+              </a:ln>
+            </p:spPr>
+            <p:style>
+              <a:lnRef idx="1">
+                <a:schemeClr val="accent1"/>
+              </a:lnRef>
+              <a:fillRef idx="0">
+                <a:schemeClr val="accent1"/>
+              </a:fillRef>
+              <a:effectRef idx="0">
+                <a:schemeClr val="accent1"/>
+              </a:effectRef>
+              <a:fontRef idx="minor">
+                <a:schemeClr val="tx1"/>
+              </a:fontRef>
+            </p:style>
+          </p:cxnSp>
+          <p:cxnSp>
+            <p:nvCxnSpPr>
+              <p:cNvPr id="79" name="Straight Connector 78"/>
+              <p:cNvCxnSpPr>
+                <a:stCxn id="62" idx="3"/>
+              </p:cNvCxnSpPr>
+              <p:nvPr/>
+            </p:nvCxnSpPr>
+            <p:spPr>
+              <a:xfrm flipH="1">
+                <a:off x="2699792" y="5909746"/>
+                <a:ext cx="346490" cy="12596"/>
+              </a:xfrm>
+              <a:prstGeom prst="line">
+                <a:avLst/>
+              </a:prstGeom>
+              <a:ln w="28575">
+                <a:prstDash val="sysDash"/>
+              </a:ln>
+            </p:spPr>
+            <p:style>
+              <a:lnRef idx="1">
+                <a:schemeClr val="accent1"/>
+              </a:lnRef>
+              <a:fillRef idx="0">
+                <a:schemeClr val="accent1"/>
+              </a:fillRef>
+              <a:effectRef idx="0">
+                <a:schemeClr val="accent1"/>
+              </a:effectRef>
+              <a:fontRef idx="minor">
+                <a:schemeClr val="tx1"/>
+              </a:fontRef>
+            </p:style>
+          </p:cxnSp>
+        </p:grpSp>
+        <p:grpSp>
+          <p:nvGrpSpPr>
+            <p:cNvPr id="105" name="Group 104"/>
+            <p:cNvGrpSpPr/>
+            <p:nvPr/>
+          </p:nvGrpSpPr>
+          <p:grpSpPr>
+            <a:xfrm>
+              <a:off x="3419872" y="3834110"/>
+              <a:ext cx="2016224" cy="1530752"/>
+              <a:chOff x="3707904" y="3635732"/>
+              <a:chExt cx="2016224" cy="1530752"/>
+            </a:xfrm>
+          </p:grpSpPr>
+          <p:grpSp>
+            <p:nvGrpSpPr>
+              <p:cNvPr id="103" name="Group 102"/>
+              <p:cNvGrpSpPr/>
+              <p:nvPr/>
+            </p:nvGrpSpPr>
+            <p:grpSpPr>
+              <a:xfrm>
+                <a:off x="3851920" y="3933056"/>
+                <a:ext cx="1800200" cy="1233428"/>
+                <a:chOff x="3851920" y="3356992"/>
+                <a:chExt cx="1800200" cy="1233428"/>
+              </a:xfrm>
+            </p:grpSpPr>
+            <p:grpSp>
+              <p:nvGrpSpPr>
+                <p:cNvPr id="94" name="Group 93"/>
+                <p:cNvGrpSpPr/>
+                <p:nvPr/>
+              </p:nvGrpSpPr>
+              <p:grpSpPr>
+                <a:xfrm>
+                  <a:off x="3851920" y="3645024"/>
+                  <a:ext cx="1800200" cy="369332"/>
+                  <a:chOff x="3851920" y="3645024"/>
+                  <a:chExt cx="1800200" cy="369332"/>
+                </a:xfrm>
+              </p:grpSpPr>
+              <p:sp>
+                <p:nvSpPr>
+                  <p:cNvPr id="87" name="Oval 86"/>
+                  <p:cNvSpPr/>
+                  <p:nvPr/>
+                </p:nvSpPr>
+                <p:spPr>
+                  <a:xfrm>
+                    <a:off x="3851920" y="3789040"/>
+                    <a:ext cx="144016" cy="144016"/>
+                  </a:xfrm>
+                  <a:prstGeom prst="ellipse">
+                    <a:avLst/>
+                  </a:prstGeom>
+                  <a:noFill/>
+                  <a:ln>
+                    <a:solidFill>
+                      <a:schemeClr val="bg1">
+                        <a:lumMod val="65000"/>
+                      </a:schemeClr>
+                    </a:solidFill>
+                  </a:ln>
+                </p:spPr>
+                <p:style>
+                  <a:lnRef idx="2">
+                    <a:schemeClr val="accent1">
+                      <a:shade val="50000"/>
+                    </a:schemeClr>
+                  </a:lnRef>
+                  <a:fillRef idx="1">
+                    <a:schemeClr val="accent1"/>
+                  </a:fillRef>
+                  <a:effectRef idx="0">
+                    <a:schemeClr val="accent1"/>
+                  </a:effectRef>
+                  <a:fontRef idx="minor">
+                    <a:schemeClr val="lt1"/>
+                  </a:fontRef>
+                </p:style>
+                <p:txBody>
+                  <a:bodyPr rtlCol="0" anchor="ctr"/>
+                  <a:lstStyle/>
+                  <a:p>
+                    <a:pPr algn="ctr"/>
+                    <a:endParaRPr lang="es-CL"/>
+                  </a:p>
+                </p:txBody>
+              </p:sp>
+              <p:sp>
+                <p:nvSpPr>
+                  <p:cNvPr id="90" name="TextBox 89"/>
+                  <p:cNvSpPr txBox="1"/>
+                  <p:nvPr/>
+                </p:nvSpPr>
+                <p:spPr>
+                  <a:xfrm>
+                    <a:off x="3995936" y="3645024"/>
+                    <a:ext cx="1656184" cy="369332"/>
+                  </a:xfrm>
+                  <a:prstGeom prst="rect">
+                    <a:avLst/>
+                  </a:prstGeom>
+                  <a:noFill/>
+                </p:spPr>
+                <p:txBody>
+                  <a:bodyPr wrap="square" rtlCol="0">
+                    <a:spAutoFit/>
+                  </a:bodyPr>
+                  <a:lstStyle/>
+                  <a:p>
+                    <a:r>
+                      <a:rPr lang="es-CL" i="1" dirty="0" smtClean="0">
+                        <a:solidFill>
+                          <a:schemeClr val="bg1">
+                            <a:lumMod val="50000"/>
+                          </a:schemeClr>
+                        </a:solidFill>
+                      </a:rPr>
+                      <a:t>Segundo Piso</a:t>
+                    </a:r>
+                    <a:endParaRPr lang="es-CL" i="1" dirty="0">
+                      <a:solidFill>
+                        <a:schemeClr val="bg1">
+                          <a:lumMod val="50000"/>
+                        </a:schemeClr>
+                      </a:solidFill>
+                    </a:endParaRPr>
+                  </a:p>
+                </p:txBody>
+              </p:sp>
+            </p:grpSp>
+            <p:grpSp>
+              <p:nvGrpSpPr>
+                <p:cNvPr id="93" name="Group 92"/>
+                <p:cNvGrpSpPr/>
+                <p:nvPr/>
+              </p:nvGrpSpPr>
+              <p:grpSpPr>
+                <a:xfrm>
+                  <a:off x="3851920" y="3356992"/>
+                  <a:ext cx="1512168" cy="369332"/>
+                  <a:chOff x="3851920" y="3356992"/>
+                  <a:chExt cx="1512168" cy="369332"/>
+                </a:xfrm>
+              </p:grpSpPr>
+              <p:sp>
+                <p:nvSpPr>
+                  <p:cNvPr id="86" name="TextBox 85"/>
+                  <p:cNvSpPr txBox="1"/>
+                  <p:nvPr/>
+                </p:nvSpPr>
+                <p:spPr>
+                  <a:xfrm>
+                    <a:off x="3995936" y="3356992"/>
+                    <a:ext cx="1368152" cy="369332"/>
+                  </a:xfrm>
+                  <a:prstGeom prst="rect">
+                    <a:avLst/>
+                  </a:prstGeom>
+                  <a:noFill/>
+                </p:spPr>
+                <p:txBody>
+                  <a:bodyPr wrap="square" rtlCol="0">
+                    <a:spAutoFit/>
+                  </a:bodyPr>
+                  <a:lstStyle/>
+                  <a:p>
+                    <a:r>
+                      <a:rPr lang="es-CL" i="1" dirty="0" smtClean="0">
+                        <a:solidFill>
+                          <a:schemeClr val="bg1">
+                            <a:lumMod val="50000"/>
+                          </a:schemeClr>
+                        </a:solidFill>
+                      </a:rPr>
+                      <a:t>Primer Piso</a:t>
+                    </a:r>
+                    <a:endParaRPr lang="es-CL" i="1" dirty="0">
+                      <a:solidFill>
+                        <a:schemeClr val="bg1">
+                          <a:lumMod val="50000"/>
+                        </a:schemeClr>
+                      </a:solidFill>
+                    </a:endParaRPr>
+                  </a:p>
+                </p:txBody>
+              </p:sp>
+              <p:grpSp>
+                <p:nvGrpSpPr>
+                  <p:cNvPr id="92" name="Group 91"/>
+                  <p:cNvGrpSpPr/>
+                  <p:nvPr/>
+                </p:nvGrpSpPr>
+                <p:grpSpPr>
+                  <a:xfrm>
+                    <a:off x="3851920" y="3501008"/>
+                    <a:ext cx="144016" cy="144016"/>
+                    <a:chOff x="3851920" y="3501008"/>
+                    <a:chExt cx="144016" cy="144016"/>
+                  </a:xfrm>
+                </p:grpSpPr>
+                <p:sp>
+                  <p:nvSpPr>
+                    <p:cNvPr id="84" name="Oval 83"/>
+                    <p:cNvSpPr/>
+                    <p:nvPr/>
+                  </p:nvSpPr>
+                  <p:spPr>
+                    <a:xfrm>
+                      <a:off x="3851920" y="3501008"/>
+                      <a:ext cx="144016" cy="144016"/>
+                    </a:xfrm>
+                    <a:prstGeom prst="ellipse">
+                      <a:avLst/>
+                    </a:prstGeom>
+                    <a:noFill/>
+                    <a:ln>
+                      <a:solidFill>
+                        <a:schemeClr val="bg1">
+                          <a:lumMod val="65000"/>
+                        </a:schemeClr>
+                      </a:solidFill>
+                    </a:ln>
+                  </p:spPr>
+                  <p:style>
+                    <a:lnRef idx="2">
+                      <a:schemeClr val="accent1">
+                        <a:shade val="50000"/>
+                      </a:schemeClr>
+                    </a:lnRef>
+                    <a:fillRef idx="1">
+                      <a:schemeClr val="accent1"/>
+                    </a:fillRef>
+                    <a:effectRef idx="0">
+                      <a:schemeClr val="accent1"/>
+                    </a:effectRef>
+                    <a:fontRef idx="minor">
+                      <a:schemeClr val="lt1"/>
+                    </a:fontRef>
+                  </p:style>
+                  <p:txBody>
+                    <a:bodyPr rtlCol="0" anchor="ctr"/>
+                    <a:lstStyle/>
+                    <a:p>
+                      <a:pPr algn="ctr"/>
+                      <a:endParaRPr lang="es-CL"/>
+                    </a:p>
+                  </p:txBody>
+                </p:sp>
+                <p:sp>
+                  <p:nvSpPr>
+                    <p:cNvPr id="91" name="Oval 90"/>
+                    <p:cNvSpPr/>
+                    <p:nvPr/>
+                  </p:nvSpPr>
+                  <p:spPr>
+                    <a:xfrm>
+                      <a:off x="3899470" y="3548456"/>
+                      <a:ext cx="45719" cy="45719"/>
+                    </a:xfrm>
+                    <a:prstGeom prst="ellipse">
+                      <a:avLst/>
+                    </a:prstGeom>
+                    <a:solidFill>
+                      <a:schemeClr val="accent1">
+                        <a:lumMod val="75000"/>
+                      </a:schemeClr>
+                    </a:solidFill>
+                  </p:spPr>
+                  <p:style>
+                    <a:lnRef idx="2">
+                      <a:schemeClr val="accent1">
+                        <a:shade val="50000"/>
+                      </a:schemeClr>
+                    </a:lnRef>
+                    <a:fillRef idx="1">
+                      <a:schemeClr val="accent1"/>
+                    </a:fillRef>
+                    <a:effectRef idx="0">
+                      <a:schemeClr val="accent1"/>
+                    </a:effectRef>
+                    <a:fontRef idx="minor">
+                      <a:schemeClr val="lt1"/>
+                    </a:fontRef>
+                  </p:style>
+                  <p:txBody>
+                    <a:bodyPr rtlCol="0" anchor="ctr"/>
+                    <a:lstStyle/>
+                    <a:p>
+                      <a:pPr algn="ctr"/>
+                      <a:endParaRPr lang="es-CL"/>
+                    </a:p>
+                  </p:txBody>
+                </p:sp>
+              </p:grpSp>
+            </p:grpSp>
+            <p:grpSp>
+              <p:nvGrpSpPr>
+                <p:cNvPr id="95" name="Group 94"/>
+                <p:cNvGrpSpPr/>
+                <p:nvPr/>
+              </p:nvGrpSpPr>
+              <p:grpSpPr>
+                <a:xfrm>
+                  <a:off x="3851920" y="3933056"/>
+                  <a:ext cx="1512168" cy="369332"/>
+                  <a:chOff x="3851920" y="3645024"/>
+                  <a:chExt cx="1512168" cy="369332"/>
+                </a:xfrm>
+              </p:grpSpPr>
+              <p:sp>
+                <p:nvSpPr>
+                  <p:cNvPr id="96" name="Oval 95"/>
+                  <p:cNvSpPr/>
+                  <p:nvPr/>
+                </p:nvSpPr>
+                <p:spPr>
+                  <a:xfrm>
+                    <a:off x="3851920" y="3789040"/>
+                    <a:ext cx="144016" cy="144016"/>
+                  </a:xfrm>
+                  <a:prstGeom prst="ellipse">
+                    <a:avLst/>
+                  </a:prstGeom>
+                  <a:noFill/>
+                  <a:ln>
+                    <a:solidFill>
+                      <a:schemeClr val="bg1">
+                        <a:lumMod val="65000"/>
+                      </a:schemeClr>
+                    </a:solidFill>
+                  </a:ln>
+                </p:spPr>
+                <p:style>
+                  <a:lnRef idx="2">
+                    <a:schemeClr val="accent1">
+                      <a:shade val="50000"/>
+                    </a:schemeClr>
+                  </a:lnRef>
+                  <a:fillRef idx="1">
+                    <a:schemeClr val="accent1"/>
+                  </a:fillRef>
+                  <a:effectRef idx="0">
+                    <a:schemeClr val="accent1"/>
+                  </a:effectRef>
+                  <a:fontRef idx="minor">
+                    <a:schemeClr val="lt1"/>
+                  </a:fontRef>
+                </p:style>
+                <p:txBody>
+                  <a:bodyPr rtlCol="0" anchor="ctr"/>
+                  <a:lstStyle/>
+                  <a:p>
+                    <a:pPr algn="ctr"/>
+                    <a:endParaRPr lang="es-CL"/>
+                  </a:p>
+                </p:txBody>
+              </p:sp>
+              <p:sp>
+                <p:nvSpPr>
+                  <p:cNvPr id="97" name="TextBox 96"/>
+                  <p:cNvSpPr txBox="1"/>
+                  <p:nvPr/>
+                </p:nvSpPr>
+                <p:spPr>
+                  <a:xfrm>
+                    <a:off x="3995936" y="3645024"/>
+                    <a:ext cx="1368152" cy="369332"/>
+                  </a:xfrm>
+                  <a:prstGeom prst="rect">
+                    <a:avLst/>
+                  </a:prstGeom>
+                  <a:noFill/>
+                </p:spPr>
+                <p:txBody>
+                  <a:bodyPr wrap="square" rtlCol="0">
+                    <a:spAutoFit/>
+                  </a:bodyPr>
+                  <a:lstStyle/>
+                  <a:p>
+                    <a:r>
+                      <a:rPr lang="es-CL" i="1" dirty="0" smtClean="0">
+                        <a:solidFill>
+                          <a:schemeClr val="bg1">
+                            <a:lumMod val="50000"/>
+                          </a:schemeClr>
+                        </a:solidFill>
+                      </a:rPr>
+                      <a:t>Tercer Piso</a:t>
+                    </a:r>
+                    <a:endParaRPr lang="es-CL" i="1" dirty="0">
+                      <a:solidFill>
+                        <a:schemeClr val="bg1">
+                          <a:lumMod val="50000"/>
+                        </a:schemeClr>
+                      </a:solidFill>
+                    </a:endParaRPr>
+                  </a:p>
+                </p:txBody>
+              </p:sp>
+            </p:grpSp>
+            <p:grpSp>
+              <p:nvGrpSpPr>
+                <p:cNvPr id="98" name="Group 97"/>
+                <p:cNvGrpSpPr/>
+                <p:nvPr/>
+              </p:nvGrpSpPr>
+              <p:grpSpPr>
+                <a:xfrm>
+                  <a:off x="3851920" y="4221088"/>
+                  <a:ext cx="1512168" cy="369332"/>
+                  <a:chOff x="3851920" y="3645024"/>
+                  <a:chExt cx="1512168" cy="369332"/>
+                </a:xfrm>
+              </p:grpSpPr>
+              <p:sp>
+                <p:nvSpPr>
+                  <p:cNvPr id="99" name="Oval 98"/>
+                  <p:cNvSpPr/>
+                  <p:nvPr/>
+                </p:nvSpPr>
+                <p:spPr>
+                  <a:xfrm>
+                    <a:off x="3851920" y="3789040"/>
+                    <a:ext cx="144016" cy="144016"/>
+                  </a:xfrm>
+                  <a:prstGeom prst="ellipse">
+                    <a:avLst/>
+                  </a:prstGeom>
+                  <a:noFill/>
+                  <a:ln>
+                    <a:solidFill>
+                      <a:schemeClr val="bg1">
+                        <a:lumMod val="65000"/>
+                      </a:schemeClr>
+                    </a:solidFill>
+                  </a:ln>
+                </p:spPr>
+                <p:style>
+                  <a:lnRef idx="2">
+                    <a:schemeClr val="accent1">
+                      <a:shade val="50000"/>
+                    </a:schemeClr>
+                  </a:lnRef>
+                  <a:fillRef idx="1">
+                    <a:schemeClr val="accent1"/>
+                  </a:fillRef>
+                  <a:effectRef idx="0">
+                    <a:schemeClr val="accent1"/>
+                  </a:effectRef>
+                  <a:fontRef idx="minor">
+                    <a:schemeClr val="lt1"/>
+                  </a:fontRef>
+                </p:style>
+                <p:txBody>
+                  <a:bodyPr rtlCol="0" anchor="ctr"/>
+                  <a:lstStyle/>
+                  <a:p>
+                    <a:pPr algn="ctr"/>
+                    <a:endParaRPr lang="es-CL"/>
+                  </a:p>
+                </p:txBody>
+              </p:sp>
+              <p:sp>
+                <p:nvSpPr>
+                  <p:cNvPr id="100" name="TextBox 99"/>
+                  <p:cNvSpPr txBox="1"/>
+                  <p:nvPr/>
+                </p:nvSpPr>
+                <p:spPr>
+                  <a:xfrm>
+                    <a:off x="3995936" y="3645024"/>
+                    <a:ext cx="1368152" cy="369332"/>
+                  </a:xfrm>
+                  <a:prstGeom prst="rect">
+                    <a:avLst/>
+                  </a:prstGeom>
+                  <a:noFill/>
+                </p:spPr>
+                <p:txBody>
+                  <a:bodyPr wrap="square" rtlCol="0">
+                    <a:spAutoFit/>
+                  </a:bodyPr>
+                  <a:lstStyle/>
+                  <a:p>
+                    <a:r>
+                      <a:rPr lang="es-CL" i="1" dirty="0" smtClean="0">
+                        <a:solidFill>
+                          <a:schemeClr val="bg1">
+                            <a:lumMod val="50000"/>
+                          </a:schemeClr>
+                        </a:solidFill>
+                      </a:rPr>
+                      <a:t>Cuarto Piso</a:t>
+                    </a:r>
+                    <a:endParaRPr lang="es-CL" i="1" dirty="0">
+                      <a:solidFill>
+                        <a:schemeClr val="bg1">
+                          <a:lumMod val="50000"/>
+                        </a:schemeClr>
+                      </a:solidFill>
+                    </a:endParaRPr>
+                  </a:p>
+                </p:txBody>
+              </p:sp>
+            </p:grpSp>
+          </p:grpSp>
+          <p:sp>
+            <p:nvSpPr>
+              <p:cNvPr id="104" name="TextBox 103"/>
+              <p:cNvSpPr txBox="1"/>
+              <p:nvPr/>
+            </p:nvSpPr>
+            <p:spPr>
+              <a:xfrm>
+                <a:off x="3707904" y="3635732"/>
+                <a:ext cx="2016224" cy="369332"/>
+              </a:xfrm>
+              <a:prstGeom prst="rect">
+                <a:avLst/>
+              </a:prstGeom>
+              <a:noFill/>
+            </p:spPr>
+            <p:txBody>
+              <a:bodyPr wrap="square" rtlCol="0">
+                <a:spAutoFit/>
+              </a:bodyPr>
+              <a:lstStyle/>
+              <a:p>
+                <a:r>
+                  <a:rPr lang="es-CL" i="1" dirty="0" smtClean="0">
+                    <a:solidFill>
+                      <a:schemeClr val="bg1">
+                        <a:lumMod val="50000"/>
+                      </a:schemeClr>
+                    </a:solidFill>
+                  </a:rPr>
+                  <a:t>Seleccionar Vista:</a:t>
+                </a:r>
+                <a:endParaRPr lang="es-CL" i="1" dirty="0">
+                  <a:solidFill>
+                    <a:schemeClr val="bg1">
+                      <a:lumMod val="50000"/>
+                    </a:schemeClr>
+                  </a:solidFill>
+                </a:endParaRPr>
+              </a:p>
+            </p:txBody>
+          </p:sp>
+        </p:grpSp>
+        <p:grpSp>
+          <p:nvGrpSpPr>
+            <p:cNvPr id="115" name="Group 114"/>
+            <p:cNvGrpSpPr/>
+            <p:nvPr/>
+          </p:nvGrpSpPr>
+          <p:grpSpPr>
+            <a:xfrm>
+              <a:off x="5292080" y="3284984"/>
+              <a:ext cx="2160240" cy="792088"/>
+              <a:chOff x="5292080" y="3284984"/>
+              <a:chExt cx="2160240" cy="792088"/>
+            </a:xfrm>
+          </p:grpSpPr>
+          <p:sp>
+            <p:nvSpPr>
+              <p:cNvPr id="110" name="Rectangle 109"/>
+              <p:cNvSpPr/>
+              <p:nvPr/>
+            </p:nvSpPr>
+            <p:spPr>
+              <a:xfrm>
+                <a:off x="5364088" y="3645024"/>
+                <a:ext cx="648072" cy="432048"/>
+              </a:xfrm>
+              <a:prstGeom prst="rect">
+                <a:avLst/>
+              </a:prstGeom>
+              <a:solidFill>
+                <a:srgbClr val="9933FF">
+                  <a:alpha val="60000"/>
+                </a:srgbClr>
+              </a:solidFill>
+              <a:ln>
+                <a:solidFill>
+                  <a:schemeClr val="tx1"/>
+                </a:solidFill>
+              </a:ln>
+            </p:spPr>
+            <p:style>
+              <a:lnRef idx="2">
+                <a:schemeClr val="accent1">
+                  <a:shade val="50000"/>
+                </a:schemeClr>
+              </a:lnRef>
+              <a:fillRef idx="1">
+                <a:schemeClr val="accent1"/>
+              </a:fillRef>
+              <a:effectRef idx="0">
+                <a:schemeClr val="accent1"/>
+              </a:effectRef>
+              <a:fontRef idx="minor">
+                <a:schemeClr val="lt1"/>
+              </a:fontRef>
+            </p:style>
+            <p:txBody>
+              <a:bodyPr rtlCol="0" anchor="ctr"/>
+              <a:lstStyle/>
+              <a:p>
+                <a:pPr algn="ctr"/>
+                <a:endParaRPr lang="es-CL"/>
+              </a:p>
+            </p:txBody>
+          </p:sp>
+          <p:sp>
+            <p:nvSpPr>
+              <p:cNvPr id="111" name="Rectangle 110"/>
+              <p:cNvSpPr/>
+              <p:nvPr/>
+            </p:nvSpPr>
+            <p:spPr>
+              <a:xfrm>
+                <a:off x="6084168" y="3645024"/>
+                <a:ext cx="648072" cy="432048"/>
+              </a:xfrm>
+              <a:prstGeom prst="rect">
+                <a:avLst/>
+              </a:prstGeom>
+              <a:solidFill>
+                <a:srgbClr val="9933FF">
+                  <a:alpha val="60000"/>
+                </a:srgbClr>
+              </a:solidFill>
+              <a:ln>
+                <a:solidFill>
+                  <a:schemeClr val="tx1"/>
+                </a:solidFill>
+              </a:ln>
+            </p:spPr>
+            <p:style>
+              <a:lnRef idx="2">
+                <a:schemeClr val="accent1">
+                  <a:shade val="50000"/>
+                </a:schemeClr>
+              </a:lnRef>
+              <a:fillRef idx="1">
+                <a:schemeClr val="accent1"/>
+              </a:fillRef>
+              <a:effectRef idx="0">
+                <a:schemeClr val="accent1"/>
+              </a:effectRef>
+              <a:fontRef idx="minor">
+                <a:schemeClr val="lt1"/>
+              </a:fontRef>
+            </p:style>
+            <p:txBody>
+              <a:bodyPr rtlCol="0" anchor="ctr"/>
+              <a:lstStyle/>
+              <a:p>
+                <a:pPr algn="ctr"/>
+                <a:endParaRPr lang="es-CL"/>
+              </a:p>
+            </p:txBody>
+          </p:sp>
+          <p:sp>
+            <p:nvSpPr>
+              <p:cNvPr id="112" name="Rectangle 111"/>
+              <p:cNvSpPr/>
+              <p:nvPr/>
+            </p:nvSpPr>
+            <p:spPr>
+              <a:xfrm>
+                <a:off x="6804248" y="3645024"/>
+                <a:ext cx="648072" cy="432048"/>
+              </a:xfrm>
+              <a:prstGeom prst="rect">
+                <a:avLst/>
+              </a:prstGeom>
+              <a:solidFill>
+                <a:srgbClr val="9933FF">
+                  <a:alpha val="60000"/>
+                </a:srgbClr>
+              </a:solidFill>
+              <a:ln>
+                <a:solidFill>
+                  <a:schemeClr val="tx1"/>
+                </a:solidFill>
+              </a:ln>
+            </p:spPr>
+            <p:style>
+              <a:lnRef idx="2">
+                <a:schemeClr val="accent1">
+                  <a:shade val="50000"/>
+                </a:schemeClr>
+              </a:lnRef>
+              <a:fillRef idx="1">
+                <a:schemeClr val="accent1"/>
+              </a:fillRef>
+              <a:effectRef idx="0">
+                <a:schemeClr val="accent1"/>
+              </a:effectRef>
+              <a:fontRef idx="minor">
+                <a:schemeClr val="lt1"/>
+              </a:fontRef>
+            </p:style>
+            <p:txBody>
+              <a:bodyPr rtlCol="0" anchor="ctr"/>
+              <a:lstStyle/>
+              <a:p>
+                <a:pPr algn="ctr"/>
+                <a:endParaRPr lang="es-CL"/>
+              </a:p>
+            </p:txBody>
+          </p:sp>
+          <p:sp>
+            <p:nvSpPr>
+              <p:cNvPr id="113" name="TextBox 112"/>
+              <p:cNvSpPr txBox="1"/>
+              <p:nvPr/>
+            </p:nvSpPr>
+            <p:spPr>
+              <a:xfrm>
+                <a:off x="5292080" y="3284984"/>
+                <a:ext cx="2016224" cy="369332"/>
+              </a:xfrm>
+              <a:prstGeom prst="rect">
+                <a:avLst/>
+              </a:prstGeom>
+              <a:noFill/>
+            </p:spPr>
+            <p:txBody>
+              <a:bodyPr wrap="square" rtlCol="0">
+                <a:spAutoFit/>
+              </a:bodyPr>
+              <a:lstStyle/>
+              <a:p>
+                <a:r>
+                  <a:rPr lang="es-CL" i="1" dirty="0" smtClean="0">
+                    <a:solidFill>
+                      <a:schemeClr val="bg1">
+                        <a:lumMod val="50000"/>
+                      </a:schemeClr>
+                    </a:solidFill>
+                  </a:rPr>
+                  <a:t>Fotos:</a:t>
+                </a:r>
+                <a:endParaRPr lang="es-CL" i="1" dirty="0">
+                  <a:solidFill>
+                    <a:schemeClr val="bg1">
+                      <a:lumMod val="50000"/>
+                    </a:schemeClr>
+                  </a:solidFill>
+                </a:endParaRPr>
+              </a:p>
+            </p:txBody>
+          </p:sp>
+        </p:grpSp>
+        <p:sp>
+          <p:nvSpPr>
+            <p:cNvPr id="114" name="TextBox 113"/>
+            <p:cNvSpPr txBox="1"/>
+            <p:nvPr/>
+          </p:nvSpPr>
+          <p:spPr>
+            <a:xfrm>
+              <a:off x="5292080" y="4211796"/>
+              <a:ext cx="2520280" cy="1200329"/>
+            </a:xfrm>
+            <a:prstGeom prst="rect">
+              <a:avLst/>
+            </a:prstGeom>
+            <a:noFill/>
+          </p:spPr>
+          <p:txBody>
+            <a:bodyPr wrap="square" rtlCol="0">
+              <a:spAutoFit/>
+            </a:bodyPr>
+            <a:lstStyle/>
+            <a:p>
+              <a:r>
+                <a:rPr lang="es-CL" i="1" dirty="0" smtClean="0">
+                  <a:solidFill>
+                    <a:schemeClr val="bg1">
+                      <a:lumMod val="50000"/>
+                    </a:schemeClr>
+                  </a:solidFill>
+                </a:rPr>
+                <a:t>Descripción:</a:t>
+              </a:r>
+              <a:br>
+                <a:rPr lang="es-CL" i="1" dirty="0" smtClean="0">
+                  <a:solidFill>
+                    <a:schemeClr val="bg1">
+                      <a:lumMod val="50000"/>
+                    </a:schemeClr>
+                  </a:solidFill>
+                </a:rPr>
+              </a:br>
+              <a:r>
+                <a:rPr lang="es-CL" i="1" dirty="0" smtClean="0">
+                  <a:solidFill>
+                    <a:schemeClr val="bg1">
+                      <a:lumMod val="50000"/>
+                    </a:schemeClr>
+                  </a:solidFill>
+                </a:rPr>
+                <a:t>El San Agustín es un edificio de la facultad de Ingeniería</a:t>
+              </a:r>
+              <a:endParaRPr lang="es-CL" i="1" dirty="0">
+                <a:solidFill>
+                  <a:schemeClr val="bg1">
+                    <a:lumMod val="50000"/>
+                  </a:schemeClr>
+                </a:solidFill>
+              </a:endParaRPr>
+            </a:p>
+          </p:txBody>
+        </p:sp>
+        <p:sp>
+          <p:nvSpPr>
+            <p:cNvPr id="116" name="TextBox 115"/>
+            <p:cNvSpPr txBox="1"/>
+            <p:nvPr/>
+          </p:nvSpPr>
+          <p:spPr>
+            <a:xfrm>
+              <a:off x="5292080" y="5517232"/>
+              <a:ext cx="2016224" cy="369332"/>
+            </a:xfrm>
+            <a:prstGeom prst="rect">
+              <a:avLst/>
+            </a:prstGeom>
+            <a:noFill/>
+          </p:spPr>
+          <p:txBody>
+            <a:bodyPr wrap="square" rtlCol="0">
+              <a:spAutoFit/>
+            </a:bodyPr>
+            <a:lstStyle/>
+            <a:p>
+              <a:r>
+                <a:rPr lang="es-CL" i="1" u="sng" dirty="0" smtClean="0">
+                  <a:solidFill>
+                    <a:schemeClr val="bg1">
+                      <a:lumMod val="50000"/>
+                    </a:schemeClr>
+                  </a:solidFill>
+                </a:rPr>
+                <a:t>Ver Comentarios..</a:t>
+              </a:r>
+              <a:endParaRPr lang="es-CL" i="1" u="sng" dirty="0">
+                <a:solidFill>
+                  <a:schemeClr val="bg1">
+                    <a:lumMod val="50000"/>
+                  </a:schemeClr>
+                </a:solidFill>
+              </a:endParaRPr>
+            </a:p>
+          </p:txBody>
+        </p:sp>
+      </p:grpSp>
+      <p:sp>
+        <p:nvSpPr>
+          <p:cNvPr id="122" name="Isosceles Triangle 121"/>
+          <p:cNvSpPr/>
+          <p:nvPr/>
+        </p:nvSpPr>
+        <p:spPr>
+          <a:xfrm rot="16200000">
+            <a:off x="2231739" y="3969060"/>
+            <a:ext cx="216024" cy="432048"/>
+          </a:xfrm>
+          <a:prstGeom prst="triangle">
+            <a:avLst/>
+          </a:prstGeom>
+          <a:solidFill>
+            <a:srgbClr val="DCE6F2">
+              <a:alpha val="80000"/>
+            </a:srgbClr>
+          </a:solidFill>
+          <a:ln>
+            <a:solidFill>
+              <a:schemeClr val="accent1"/>
+            </a:solidFill>
+          </a:ln>
+        </p:spPr>
+        <p:style>
+          <a:lnRef idx="2">
+            <a:schemeClr val="accent1">
+              <a:shade val="50000"/>
+            </a:schemeClr>
+          </a:lnRef>
+          <a:fillRef idx="1">
+            <a:schemeClr val="accent1"/>
+          </a:fillRef>
+          <a:effectRef idx="0">
+            <a:schemeClr val="accent1"/>
+          </a:effectRef>
+          <a:fontRef idx="minor">
+            <a:schemeClr val="lt1"/>
+          </a:fontRef>
+        </p:style>
+        <p:txBody>
+          <a:bodyPr rtlCol="0" anchor="ctr"/>
+          <a:lstStyle/>
+          <a:p>
+            <a:pPr algn="ctr"/>
+            <a:endParaRPr lang="es-CL"/>
+          </a:p>
+        </p:txBody>
+      </p:sp>
+      <p:grpSp>
+        <p:nvGrpSpPr>
+          <p:cNvPr id="125" name="Group 124"/>
+          <p:cNvGrpSpPr/>
+          <p:nvPr/>
+        </p:nvGrpSpPr>
+        <p:grpSpPr>
+          <a:xfrm>
+            <a:off x="2051720" y="4005064"/>
+            <a:ext cx="222626" cy="220189"/>
+            <a:chOff x="2144867" y="4371037"/>
+            <a:chExt cx="222626" cy="220189"/>
+          </a:xfrm>
+        </p:grpSpPr>
+        <p:cxnSp>
+          <p:nvCxnSpPr>
+            <p:cNvPr id="123" name="Straight Connector 122"/>
+            <p:cNvCxnSpPr/>
+            <p:nvPr/>
+          </p:nvCxnSpPr>
+          <p:spPr>
+            <a:xfrm rot="20666605" flipH="1">
+              <a:off x="2144867" y="4375202"/>
+              <a:ext cx="72008" cy="216024"/>
+            </a:xfrm>
+            <a:prstGeom prst="line">
+              <a:avLst/>
+            </a:prstGeom>
+            <a:ln w="38100">
+              <a:solidFill>
+                <a:schemeClr val="tx1">
+                  <a:lumMod val="85000"/>
+                  <a:lumOff val="15000"/>
+                </a:schemeClr>
+              </a:solidFill>
+            </a:ln>
+          </p:spPr>
+          <p:style>
+            <a:lnRef idx="1">
+              <a:schemeClr val="accent1"/>
+            </a:lnRef>
+            <a:fillRef idx="0">
+              <a:schemeClr val="accent1"/>
+            </a:fillRef>
+            <a:effectRef idx="0">
+              <a:schemeClr val="accent1"/>
+            </a:effectRef>
+            <a:fontRef idx="minor">
+              <a:schemeClr val="tx1"/>
+            </a:fontRef>
+          </p:style>
+        </p:cxnSp>
+        <p:sp>
+          <p:nvSpPr>
+            <p:cNvPr id="124" name="Isosceles Triangle 123"/>
+            <p:cNvSpPr/>
+            <p:nvPr/>
+          </p:nvSpPr>
+          <p:spPr>
+            <a:xfrm rot="5646931">
+              <a:off x="2236843" y="4333037"/>
+              <a:ext cx="92650" cy="168650"/>
+            </a:xfrm>
+            <a:prstGeom prst="triangle">
+              <a:avLst/>
+            </a:prstGeom>
+            <a:solidFill>
+              <a:schemeClr val="accent2"/>
+            </a:solidFill>
+            <a:ln>
+              <a:solidFill>
+                <a:schemeClr val="accent2">
+                  <a:lumMod val="50000"/>
+                </a:schemeClr>
+              </a:solidFill>
+            </a:ln>
+          </p:spPr>
+          <p:style>
+            <a:lnRef idx="2">
+              <a:schemeClr val="accent1">
+                <a:shade val="50000"/>
+              </a:schemeClr>
+            </a:lnRef>
+            <a:fillRef idx="1">
+              <a:schemeClr val="accent1"/>
+            </a:fillRef>
+            <a:effectRef idx="0">
+              <a:schemeClr val="accent1"/>
+            </a:effectRef>
+            <a:fontRef idx="minor">
+              <a:schemeClr val="lt1"/>
+            </a:fontRef>
+          </p:style>
+          <p:txBody>
+            <a:bodyPr rtlCol="0" anchor="ctr"/>
+            <a:lstStyle/>
+            <a:p>
+              <a:pPr algn="ctr"/>
+              <a:endParaRPr lang="es-CL"/>
+            </a:p>
+          </p:txBody>
+        </p:sp>
+      </p:grpSp>
+    </p:spTree>
+  </p:cSld>
+  <p:clrMapOvr>
+    <a:masterClrMapping/>
+  </p:clrMapOvr>
+  <p:transition advClick="0"/>
   <p:timing>
     <p:tnLst>
       <p:par>
@@ -6133,15 +8586,7 @@
                   <a:schemeClr val="tx1"/>
                 </a:solidFill>
               </a:rPr>
-              <a:t>|	Facultad	|	</a:t>
-            </a:r>
-            <a:r>
-              <a:rPr lang="es-CL" sz="2400" dirty="0" smtClean="0">
-                <a:solidFill>
-                  <a:schemeClr val="tx1"/>
-                </a:solidFill>
-              </a:rPr>
-              <a:t>	</a:t>
+              <a:t>|	Facultad	|		</a:t>
             </a:r>
             <a:endParaRPr lang="es-CL" dirty="0">
               <a:solidFill>
@@ -7329,15 +9774,7 @@
                     <a:schemeClr val="tx1"/>
                   </a:solidFill>
                 </a:rPr>
-                <a:t>|	Facultad	|	</a:t>
-              </a:r>
-              <a:r>
-                <a:rPr lang="es-CL" sz="2400" dirty="0" smtClean="0">
-                  <a:solidFill>
-                    <a:schemeClr val="tx1"/>
-                  </a:solidFill>
-                </a:rPr>
-                <a:t>	</a:t>
+                <a:t>|	Facultad	|		</a:t>
               </a:r>
               <a:endParaRPr lang="es-CL" dirty="0">
                 <a:solidFill>
@@ -8724,15 +11161,7 @@
                   <a:schemeClr val="tx1"/>
                 </a:solidFill>
               </a:rPr>
-              <a:t>	|	Facultad	|	</a:t>
-            </a:r>
-            <a:r>
-              <a:rPr lang="es-CL" sz="2400" dirty="0" smtClean="0">
-                <a:solidFill>
-                  <a:schemeClr val="tx1"/>
-                </a:solidFill>
-              </a:rPr>
-              <a:t>	</a:t>
+              <a:t>	|	Facultad	|		</a:t>
             </a:r>
             <a:endParaRPr lang="es-CL" dirty="0">
               <a:solidFill>
@@ -21330,13 +23759,14 @@
             <a:avLst/>
           </a:prstGeom>
           <a:solidFill>
-            <a:schemeClr val="accent2"/>
+            <a:schemeClr val="accent1">
+              <a:lumMod val="60000"/>
+              <a:lumOff val="40000"/>
+            </a:schemeClr>
           </a:solidFill>
           <a:ln>
             <a:solidFill>
-              <a:schemeClr val="accent2">
-                <a:lumMod val="50000"/>
-              </a:schemeClr>
+              <a:schemeClr val="accent1"/>
             </a:solidFill>
           </a:ln>
         </p:spPr>
@@ -21402,13 +23832,14 @@
             <a:avLst/>
           </a:prstGeom>
           <a:solidFill>
-            <a:schemeClr val="accent2"/>
+            <a:schemeClr val="accent1">
+              <a:lumMod val="60000"/>
+              <a:lumOff val="40000"/>
+            </a:schemeClr>
           </a:solidFill>
           <a:ln>
             <a:solidFill>
-              <a:schemeClr val="accent2">
-                <a:lumMod val="50000"/>
-              </a:schemeClr>
+              <a:schemeClr val="accent1"/>
             </a:solidFill>
           </a:ln>
         </p:spPr>
@@ -21459,13 +23890,14 @@
             <a:avLst/>
           </a:prstGeom>
           <a:solidFill>
-            <a:schemeClr val="accent2"/>
+            <a:schemeClr val="accent1">
+              <a:lumMod val="60000"/>
+              <a:lumOff val="40000"/>
+            </a:schemeClr>
           </a:solidFill>
           <a:ln>
             <a:solidFill>
-              <a:schemeClr val="accent2">
-                <a:lumMod val="50000"/>
-              </a:schemeClr>
+              <a:schemeClr val="accent1"/>
             </a:solidFill>
           </a:ln>
         </p:spPr>
@@ -21508,72 +23940,6 @@
       </p:sp>
       <p:sp>
         <p:nvSpPr>
-          <p:cNvPr id="43" name="Rectangle 42">
-            <a:hlinkClick r:id="rId4" action="ppaction://hlinksldjump"/>
-          </p:cNvPr>
-          <p:cNvSpPr/>
-          <p:nvPr/>
-        </p:nvSpPr>
-        <p:spPr>
-          <a:xfrm>
-            <a:off x="5364088" y="692696"/>
-            <a:ext cx="1944216" cy="576064"/>
-          </a:xfrm>
-          <a:prstGeom prst="rect">
-            <a:avLst/>
-          </a:prstGeom>
-          <a:solidFill>
-            <a:schemeClr val="accent2">
-              <a:lumMod val="75000"/>
-            </a:schemeClr>
-          </a:solidFill>
-          <a:ln>
-            <a:solidFill>
-              <a:schemeClr val="accent2">
-                <a:lumMod val="50000"/>
-              </a:schemeClr>
-            </a:solidFill>
-          </a:ln>
-        </p:spPr>
-        <p:style>
-          <a:lnRef idx="2">
-            <a:schemeClr val="accent1">
-              <a:shade val="50000"/>
-            </a:schemeClr>
-          </a:lnRef>
-          <a:fillRef idx="1">
-            <a:schemeClr val="accent1"/>
-          </a:fillRef>
-          <a:effectRef idx="0">
-            <a:schemeClr val="accent1"/>
-          </a:effectRef>
-          <a:fontRef idx="minor">
-            <a:schemeClr val="lt1"/>
-          </a:fontRef>
-        </p:style>
-        <p:txBody>
-          <a:bodyPr rtlCol="0" anchor="ctr"/>
-          <a:lstStyle/>
-          <a:p>
-            <a:pPr algn="ctr"/>
-            <a:r>
-              <a:rPr lang="es-CL" sz="2400" dirty="0" smtClean="0">
-                <a:solidFill>
-                  <a:schemeClr val="bg1"/>
-                </a:solidFill>
-              </a:rPr>
-              <a:t>Eventos</a:t>
-            </a:r>
-            <a:endParaRPr lang="es-CL" sz="2400" dirty="0">
-              <a:solidFill>
-                <a:schemeClr val="bg1"/>
-              </a:solidFill>
-            </a:endParaRPr>
-          </a:p>
-        </p:txBody>
-      </p:sp>
-      <p:sp>
-        <p:nvSpPr>
           <p:cNvPr id="28" name="Rectangle 27">
             <a:hlinkClick r:id="rId5" action="ppaction://hlinksldjump"/>
           </p:cNvPr>
@@ -21589,13 +23955,14 @@
             <a:avLst/>
           </a:prstGeom>
           <a:solidFill>
-            <a:schemeClr val="accent2"/>
+            <a:schemeClr val="accent1">
+              <a:lumMod val="60000"/>
+              <a:lumOff val="40000"/>
+            </a:schemeClr>
           </a:solidFill>
           <a:ln>
             <a:solidFill>
-              <a:schemeClr val="accent2">
-                <a:lumMod val="50000"/>
-              </a:schemeClr>
+              <a:schemeClr val="accent1"/>
             </a:solidFill>
           </a:ln>
         </p:spPr>
@@ -21653,13 +24020,14 @@
             <a:avLst/>
           </a:prstGeom>
           <a:solidFill>
-            <a:schemeClr val="accent2"/>
+            <a:schemeClr val="accent1">
+              <a:lumMod val="60000"/>
+              <a:lumOff val="40000"/>
+            </a:schemeClr>
           </a:solidFill>
           <a:ln>
             <a:solidFill>
-              <a:schemeClr val="accent2">
-                <a:lumMod val="50000"/>
-              </a:schemeClr>
+              <a:schemeClr val="accent1"/>
             </a:solidFill>
           </a:ln>
         </p:spPr>
@@ -21713,6 +24081,7 @@
             <a:chOff x="2771800" y="2780928"/>
             <a:chExt cx="5328592" cy="2736304"/>
           </a:xfrm>
+          <a:noFill/>
         </p:grpSpPr>
         <p:grpSp>
           <p:nvGrpSpPr>
@@ -21727,6 +24096,7 @@
               <a:chOff x="2771800" y="2780928"/>
               <a:chExt cx="3744416" cy="2520280"/>
             </a:xfrm>
+            <a:grpFill/>
           </p:grpSpPr>
           <p:sp>
             <p:nvSpPr>
@@ -21743,11 +24113,15 @@
                 <a:avLst/>
               </a:prstGeom>
               <a:solidFill>
-                <a:schemeClr val="bg1">
-                  <a:lumMod val="50000"/>
-                  <a:alpha val="69804"/>
-                </a:schemeClr>
+                <a:srgbClr val="DCE6F2">
+                  <a:alpha val="80000"/>
+                </a:srgbClr>
               </a:solidFill>
+              <a:ln>
+                <a:solidFill>
+                  <a:schemeClr val="accent1"/>
+                </a:solidFill>
+              </a:ln>
             </p:spPr>
             <p:style>
               <a:lnRef idx="2">
@@ -21788,7 +24162,7 @@
               <a:prstGeom prst="rect">
                 <a:avLst/>
               </a:prstGeom>
-              <a:noFill/>
+              <a:grpFill/>
             </p:spPr>
             <p:txBody>
               <a:bodyPr wrap="square" rtlCol="0">
@@ -21837,12 +24211,10 @@
             <a:prstGeom prst="rect">
               <a:avLst/>
             </a:prstGeom>
-            <a:solidFill>
-              <a:schemeClr val="bg1"/>
-            </a:solidFill>
+            <a:grpFill/>
             <a:ln>
               <a:solidFill>
-                <a:schemeClr val="accent2"/>
+                <a:schemeClr val="accent1"/>
               </a:solidFill>
             </a:ln>
           </p:spPr>
@@ -21896,6 +24268,7 @@
               <a:chOff x="2987824" y="3275692"/>
               <a:chExt cx="2448272" cy="1499085"/>
             </a:xfrm>
+            <a:grpFill/>
           </p:grpSpPr>
           <p:sp>
             <p:nvSpPr>
@@ -21911,7 +24284,7 @@
               <a:prstGeom prst="rect">
                 <a:avLst/>
               </a:prstGeom>
-              <a:noFill/>
+              <a:grpFill/>
             </p:spPr>
             <p:txBody>
               <a:bodyPr wrap="square" rtlCol="0">
@@ -21954,6 +24327,7 @@
                 <a:chOff x="3131840" y="3501008"/>
                 <a:chExt cx="144016" cy="144016"/>
               </a:xfrm>
+              <a:grpFill/>
             </p:grpSpPr>
             <p:sp>
               <p:nvSpPr>
@@ -21969,12 +24343,10 @@
                 <a:prstGeom prst="rect">
                   <a:avLst/>
                 </a:prstGeom>
-                <a:solidFill>
-                  <a:schemeClr val="bg1"/>
-                </a:solidFill>
+                <a:grpFill/>
                 <a:ln>
                   <a:solidFill>
-                    <a:schemeClr val="accent2"/>
+                    <a:schemeClr val="accent1"/>
                   </a:solidFill>
                 </a:ln>
               </p:spPr>
@@ -22016,6 +24388,7 @@
                   <a:chOff x="9886" y="3645024"/>
                   <a:chExt cx="97618" cy="144016"/>
                 </a:xfrm>
+                <a:grpFill/>
               </p:grpSpPr>
               <p:cxnSp>
                 <p:nvCxnSpPr>
@@ -22031,6 +24404,7 @@
                   <a:prstGeom prst="line">
                     <a:avLst/>
                   </a:prstGeom>
+                  <a:grpFill/>
                   <a:ln w="28575">
                     <a:solidFill>
                       <a:srgbClr val="00B050"/>
@@ -22066,6 +24440,7 @@
                   <a:prstGeom prst="line">
                     <a:avLst/>
                   </a:prstGeom>
+                  <a:grpFill/>
                   <a:ln w="28575">
                     <a:solidFill>
                       <a:srgbClr val="00B050"/>
@@ -22103,12 +24478,10 @@
               <a:prstGeom prst="rect">
                 <a:avLst/>
               </a:prstGeom>
-              <a:solidFill>
-                <a:schemeClr val="bg1"/>
-              </a:solidFill>
+              <a:grpFill/>
               <a:ln>
                 <a:solidFill>
-                  <a:schemeClr val="accent2"/>
+                  <a:schemeClr val="accent1"/>
                 </a:solidFill>
               </a:ln>
             </p:spPr>
@@ -22151,7 +24524,7 @@
               <a:prstGeom prst="rect">
                 <a:avLst/>
               </a:prstGeom>
-              <a:noFill/>
+              <a:grpFill/>
             </p:spPr>
             <p:txBody>
               <a:bodyPr wrap="square" rtlCol="0">
@@ -22194,6 +24567,7 @@
                 <a:chOff x="3131840" y="3501008"/>
                 <a:chExt cx="144016" cy="144016"/>
               </a:xfrm>
+              <a:grpFill/>
             </p:grpSpPr>
             <p:sp>
               <p:nvSpPr>
@@ -22209,12 +24583,10 @@
                 <a:prstGeom prst="rect">
                   <a:avLst/>
                 </a:prstGeom>
-                <a:solidFill>
-                  <a:schemeClr val="bg1"/>
-                </a:solidFill>
+                <a:grpFill/>
                 <a:ln>
                   <a:solidFill>
-                    <a:schemeClr val="accent2"/>
+                    <a:schemeClr val="accent1"/>
                   </a:solidFill>
                 </a:ln>
               </p:spPr>
@@ -22256,6 +24628,7 @@
                   <a:chOff x="9886" y="3645024"/>
                   <a:chExt cx="97618" cy="144016"/>
                 </a:xfrm>
+                <a:grpFill/>
               </p:grpSpPr>
               <p:cxnSp>
                 <p:nvCxnSpPr>
@@ -22271,6 +24644,7 @@
                   <a:prstGeom prst="line">
                     <a:avLst/>
                   </a:prstGeom>
+                  <a:grpFill/>
                   <a:ln w="28575">
                     <a:solidFill>
                       <a:srgbClr val="00B050"/>
@@ -22306,6 +24680,7 @@
                   <a:prstGeom prst="line">
                     <a:avLst/>
                   </a:prstGeom>
+                  <a:grpFill/>
                   <a:ln w="28575">
                     <a:solidFill>
                       <a:srgbClr val="00B050"/>
@@ -22343,7 +24718,7 @@
               <a:prstGeom prst="rect">
                 <a:avLst/>
               </a:prstGeom>
-              <a:noFill/>
+              <a:grpFill/>
             </p:spPr>
             <p:txBody>
               <a:bodyPr wrap="square" rtlCol="0">
@@ -22387,12 +24762,10 @@
               <a:prstGeom prst="rect">
                 <a:avLst/>
               </a:prstGeom>
-              <a:solidFill>
-                <a:schemeClr val="bg1"/>
-              </a:solidFill>
+              <a:grpFill/>
               <a:ln>
                 <a:solidFill>
-                  <a:schemeClr val="accent2"/>
+                  <a:schemeClr val="accent1"/>
                 </a:solidFill>
               </a:ln>
             </p:spPr>
@@ -22435,7 +24808,7 @@
               <a:prstGeom prst="rect">
                 <a:avLst/>
               </a:prstGeom>
-              <a:noFill/>
+              <a:grpFill/>
             </p:spPr>
             <p:txBody>
               <a:bodyPr wrap="square" rtlCol="0">
@@ -22479,7 +24852,7 @@
               <a:prstGeom prst="rect">
                 <a:avLst/>
               </a:prstGeom>
-              <a:noFill/>
+              <a:grpFill/>
             </p:spPr>
             <p:txBody>
               <a:bodyPr wrap="square" rtlCol="0">
@@ -22523,6 +24896,7 @@
               <a:chOff x="5508104" y="3284984"/>
               <a:chExt cx="2232248" cy="1521460"/>
             </a:xfrm>
+            <a:grpFill/>
           </p:grpSpPr>
           <p:sp>
             <p:nvSpPr>
@@ -22538,7 +24912,7 @@
               <a:prstGeom prst="rect">
                 <a:avLst/>
               </a:prstGeom>
-              <a:noFill/>
+              <a:grpFill/>
             </p:spPr>
             <p:txBody>
               <a:bodyPr wrap="square" rtlCol="0">
@@ -22582,7 +24956,7 @@
               <a:prstGeom prst="rect">
                 <a:avLst/>
               </a:prstGeom>
-              <a:noFill/>
+              <a:grpFill/>
             </p:spPr>
             <p:txBody>
               <a:bodyPr wrap="square" rtlCol="0">
@@ -22626,12 +25000,10 @@
               <a:prstGeom prst="rect">
                 <a:avLst/>
               </a:prstGeom>
-              <a:solidFill>
-                <a:schemeClr val="bg1"/>
-              </a:solidFill>
+              <a:grpFill/>
               <a:ln>
                 <a:solidFill>
-                  <a:schemeClr val="accent2"/>
+                  <a:schemeClr val="accent1"/>
                 </a:solidFill>
               </a:ln>
             </p:spPr>
@@ -22674,7 +25046,7 @@
               <a:prstGeom prst="rect">
                 <a:avLst/>
               </a:prstGeom>
-              <a:noFill/>
+              <a:grpFill/>
             </p:spPr>
             <p:txBody>
               <a:bodyPr wrap="square" rtlCol="0">
@@ -22717,6 +25089,7 @@
                 <a:chOff x="3131840" y="3501008"/>
                 <a:chExt cx="144016" cy="144016"/>
               </a:xfrm>
+              <a:grpFill/>
             </p:grpSpPr>
             <p:sp>
               <p:nvSpPr>
@@ -22732,12 +25105,10 @@
                 <a:prstGeom prst="rect">
                   <a:avLst/>
                 </a:prstGeom>
-                <a:solidFill>
-                  <a:schemeClr val="bg1"/>
-                </a:solidFill>
+                <a:grpFill/>
                 <a:ln>
                   <a:solidFill>
-                    <a:schemeClr val="accent2"/>
+                    <a:schemeClr val="accent1"/>
                   </a:solidFill>
                 </a:ln>
               </p:spPr>
@@ -22779,6 +25150,7 @@
                   <a:chOff x="9886" y="3645024"/>
                   <a:chExt cx="97618" cy="144016"/>
                 </a:xfrm>
+                <a:grpFill/>
               </p:grpSpPr>
               <p:cxnSp>
                 <p:nvCxnSpPr>
@@ -22794,6 +25166,7 @@
                   <a:prstGeom prst="line">
                     <a:avLst/>
                   </a:prstGeom>
+                  <a:grpFill/>
                   <a:ln w="28575">
                     <a:solidFill>
                       <a:srgbClr val="00B050"/>
@@ -22829,6 +25202,7 @@
                   <a:prstGeom prst="line">
                     <a:avLst/>
                   </a:prstGeom>
+                  <a:grpFill/>
                   <a:ln w="28575">
                     <a:solidFill>
                       <a:srgbClr val="00B050"/>
@@ -22865,6 +25239,7 @@
                 <a:chOff x="3131840" y="3501008"/>
                 <a:chExt cx="144016" cy="144016"/>
               </a:xfrm>
+              <a:grpFill/>
             </p:grpSpPr>
             <p:sp>
               <p:nvSpPr>
@@ -22880,12 +25255,10 @@
                 <a:prstGeom prst="rect">
                   <a:avLst/>
                 </a:prstGeom>
-                <a:solidFill>
-                  <a:schemeClr val="bg1"/>
-                </a:solidFill>
+                <a:grpFill/>
                 <a:ln>
                   <a:solidFill>
-                    <a:schemeClr val="accent2"/>
+                    <a:schemeClr val="accent1"/>
                   </a:solidFill>
                 </a:ln>
               </p:spPr>
@@ -22927,6 +25300,7 @@
                   <a:chOff x="9886" y="3645024"/>
                   <a:chExt cx="97618" cy="144016"/>
                 </a:xfrm>
+                <a:grpFill/>
               </p:grpSpPr>
               <p:cxnSp>
                 <p:nvCxnSpPr>
@@ -22942,6 +25316,7 @@
                   <a:prstGeom prst="line">
                     <a:avLst/>
                   </a:prstGeom>
+                  <a:grpFill/>
                   <a:ln w="28575">
                     <a:solidFill>
                       <a:srgbClr val="00B050"/>
@@ -22977,6 +25352,7 @@
                   <a:prstGeom prst="line">
                     <a:avLst/>
                   </a:prstGeom>
+                  <a:grpFill/>
                   <a:ln w="28575">
                     <a:solidFill>
                       <a:srgbClr val="00B050"/>
@@ -23014,7 +25390,7 @@
               <a:prstGeom prst="rect">
                 <a:avLst/>
               </a:prstGeom>
-              <a:noFill/>
+              <a:grpFill/>
             </p:spPr>
             <p:txBody>
               <a:bodyPr wrap="square" rtlCol="0">
@@ -23058,12 +25434,10 @@
               <a:prstGeom prst="rect">
                 <a:avLst/>
               </a:prstGeom>
-              <a:solidFill>
-                <a:schemeClr val="bg1"/>
-              </a:solidFill>
+              <a:grpFill/>
               <a:ln>
                 <a:solidFill>
-                  <a:schemeClr val="accent2"/>
+                  <a:schemeClr val="accent1"/>
                 </a:solidFill>
               </a:ln>
             </p:spPr>
@@ -23106,7 +25480,7 @@
               <a:prstGeom prst="rect">
                 <a:avLst/>
               </a:prstGeom>
-              <a:noFill/>
+              <a:grpFill/>
             </p:spPr>
             <p:txBody>
               <a:bodyPr wrap="square" rtlCol="0">
@@ -23138,6 +25512,71 @@
           </p:sp>
         </p:grpSp>
       </p:grpSp>
+      <p:sp>
+        <p:nvSpPr>
+          <p:cNvPr id="43" name="Rectangle 42">
+            <a:hlinkClick r:id="rId4" action="ppaction://hlinksldjump"/>
+          </p:cNvPr>
+          <p:cNvSpPr/>
+          <p:nvPr/>
+        </p:nvSpPr>
+        <p:spPr>
+          <a:xfrm>
+            <a:off x="5364088" y="692696"/>
+            <a:ext cx="1944216" cy="576064"/>
+          </a:xfrm>
+          <a:prstGeom prst="rect">
+            <a:avLst/>
+          </a:prstGeom>
+          <a:solidFill>
+            <a:schemeClr val="tx2">
+              <a:lumMod val="60000"/>
+              <a:lumOff val="40000"/>
+            </a:schemeClr>
+          </a:solidFill>
+          <a:ln>
+            <a:solidFill>
+              <a:schemeClr val="tx2"/>
+            </a:solidFill>
+          </a:ln>
+        </p:spPr>
+        <p:style>
+          <a:lnRef idx="2">
+            <a:schemeClr val="accent1">
+              <a:shade val="50000"/>
+            </a:schemeClr>
+          </a:lnRef>
+          <a:fillRef idx="1">
+            <a:schemeClr val="accent1"/>
+          </a:fillRef>
+          <a:effectRef idx="0">
+            <a:schemeClr val="accent1"/>
+          </a:effectRef>
+          <a:fontRef idx="minor">
+            <a:schemeClr val="lt1"/>
+          </a:fontRef>
+        </p:style>
+        <p:txBody>
+          <a:bodyPr rtlCol="0" anchor="ctr"/>
+          <a:lstStyle/>
+          <a:p>
+            <a:pPr algn="ctr"/>
+            <a:r>
+              <a:rPr lang="es-CL" sz="2400" dirty="0" smtClean="0">
+                <a:solidFill>
+                  <a:schemeClr val="bg1"/>
+                </a:solidFill>
+              </a:rPr>
+              <a:t>Eventos</a:t>
+            </a:r>
+            <a:endParaRPr lang="es-CL" sz="2400" dirty="0">
+              <a:solidFill>
+                <a:schemeClr val="bg1"/>
+              </a:solidFill>
+            </a:endParaRPr>
+          </a:p>
+        </p:txBody>
+      </p:sp>
     </p:spTree>
   </p:cSld>
   <p:clrMapOvr>

</xml_diff>